<commit_message>
fix: add modificaciones finales para la expo
</commit_message>
<xml_diff>
--- a/the_minion_game/docs/dsfem_expo_reto1.pptx
+++ b/the_minion_game/docs/dsfem_expo_reto1.pptx
@@ -6,18 +6,17 @@
   </p:sldMasterIdLst>
   <p:sldIdLst>
     <p:sldId id="261" r:id="rId2"/>
-    <p:sldId id="267" r:id="rId3"/>
-    <p:sldId id="266" r:id="rId4"/>
-    <p:sldId id="262" r:id="rId5"/>
-    <p:sldId id="260" r:id="rId6"/>
-    <p:sldId id="264" r:id="rId7"/>
-    <p:sldId id="263" r:id="rId8"/>
-    <p:sldId id="270" r:id="rId9"/>
-    <p:sldId id="271" r:id="rId10"/>
-    <p:sldId id="273" r:id="rId11"/>
-    <p:sldId id="274" r:id="rId12"/>
-    <p:sldId id="277" r:id="rId13"/>
-    <p:sldId id="275" r:id="rId14"/>
+    <p:sldId id="262" r:id="rId3"/>
+    <p:sldId id="260" r:id="rId4"/>
+    <p:sldId id="264" r:id="rId5"/>
+    <p:sldId id="263" r:id="rId6"/>
+    <p:sldId id="270" r:id="rId7"/>
+    <p:sldId id="271" r:id="rId8"/>
+    <p:sldId id="273" r:id="rId9"/>
+    <p:sldId id="274" r:id="rId10"/>
+    <p:sldId id="277" r:id="rId11"/>
+    <p:sldId id="275" r:id="rId12"/>
+    <p:sldId id="278" r:id="rId13"/>
   </p:sldIdLst>
   <p:sldSz cx="12192000" cy="6858000"/>
   <p:notesSz cx="6858000" cy="9144000"/>
@@ -341,7 +340,7 @@
           <a:p>
             <a:fld id="{9AB3A824-1A51-4B26-AD58-A6D8E14F6C04}" type="datetimeFigureOut">
               <a:rPr lang="en-US" dirty="0"/>
-              <a:t>2/23/2021</a:t>
+              <a:t>2/24/2021</a:t>
             </a:fld>
             <a:endParaRPr lang="en-US" dirty="0"/>
           </a:p>
@@ -675,7 +674,7 @@
           <a:p>
             <a:fld id="{D857E33E-8B18-4087-B112-809917729534}" type="datetimeFigureOut">
               <a:rPr lang="en-US" dirty="0"/>
-              <a:t>2/23/2021</a:t>
+              <a:t>2/24/2021</a:t>
             </a:fld>
             <a:endParaRPr lang="en-US" dirty="0"/>
           </a:p>
@@ -977,7 +976,7 @@
           <a:p>
             <a:fld id="{D3FFE419-2371-464F-8239-3959401C3561}" type="datetimeFigureOut">
               <a:rPr lang="en-US" dirty="0"/>
-              <a:t>2/23/2021</a:t>
+              <a:t>2/24/2021</a:t>
             </a:fld>
             <a:endParaRPr lang="en-US" dirty="0"/>
           </a:p>
@@ -1224,7 +1223,7 @@
           <a:p>
             <a:fld id="{97D162C4-EDD9-4389-A98B-B87ECEA2A816}" type="datetimeFigureOut">
               <a:rPr lang="en-US" dirty="0"/>
-              <a:t>2/23/2021</a:t>
+              <a:t>2/24/2021</a:t>
             </a:fld>
             <a:endParaRPr lang="en-US" dirty="0"/>
           </a:p>
@@ -1631,7 +1630,7 @@
           <a:p>
             <a:fld id="{3E5059C3-6A89-4494-99FF-5A4D6FFD50EB}" type="datetimeFigureOut">
               <a:rPr lang="en-US" dirty="0"/>
-              <a:t>2/23/2021</a:t>
+              <a:t>2/24/2021</a:t>
             </a:fld>
             <a:endParaRPr lang="en-US" dirty="0"/>
           </a:p>
@@ -1945,7 +1944,7 @@
           <a:p>
             <a:fld id="{CA954B2F-12DE-47F5-8894-472B206D2E1E}" type="datetimeFigureOut">
               <a:rPr lang="en-US" dirty="0"/>
-              <a:t>2/23/2021</a:t>
+              <a:t>2/24/2021</a:t>
             </a:fld>
             <a:endParaRPr lang="en-US" dirty="0"/>
           </a:p>
@@ -2489,7 +2488,7 @@
           <a:p>
             <a:fld id="{3F30E46F-7819-4ACF-B48B-48222C2ACC88}" type="datetimeFigureOut">
               <a:rPr lang="en-US" dirty="0"/>
-              <a:t>2/23/2021</a:t>
+              <a:t>2/24/2021</a:t>
             </a:fld>
             <a:endParaRPr lang="en-US" dirty="0"/>
           </a:p>
@@ -2684,7 +2683,7 @@
           <a:p>
             <a:fld id="{1FAF3416-4057-4DAA-829D-4CA07428D088}" type="datetimeFigureOut">
               <a:rPr lang="en-US" dirty="0"/>
-              <a:t>2/23/2021</a:t>
+              <a:t>2/24/2021</a:t>
             </a:fld>
             <a:endParaRPr lang="en-US" dirty="0"/>
           </a:p>
@@ -2897,7 +2896,7 @@
           <a:p>
             <a:fld id="{921D9284-D300-4297-87F7-E791DCC15DB1}" type="datetimeFigureOut">
               <a:rPr lang="en-US" dirty="0"/>
-              <a:t>2/23/2021</a:t>
+              <a:t>2/24/2021</a:t>
             </a:fld>
             <a:endParaRPr lang="en-US" dirty="0"/>
           </a:p>
@@ -3266,7 +3265,7 @@
           <a:p>
             <a:fld id="{37D525BB-DA17-4BA0-B3C8-3AC3ABC827E6}" type="datetimeFigureOut">
               <a:rPr lang="en-US" dirty="0"/>
-              <a:t>2/23/2021</a:t>
+              <a:t>2/24/2021</a:t>
             </a:fld>
             <a:endParaRPr lang="en-US" dirty="0"/>
           </a:p>
@@ -3669,7 +3668,7 @@
           <a:p>
             <a:fld id="{B16C4C9A-3960-41CF-A4E9-2A8FB932454B}" type="datetimeFigureOut">
               <a:rPr lang="en-US" dirty="0"/>
-              <a:t>2/23/2021</a:t>
+              <a:t>2/24/2021</a:t>
             </a:fld>
             <a:endParaRPr lang="en-US" dirty="0"/>
           </a:p>
@@ -3980,7 +3979,7 @@
           <a:p>
             <a:fld id="{3CBC1C18-307B-4F68-A007-B5B542270E8D}" type="datetimeFigureOut">
               <a:rPr lang="en-US" dirty="0"/>
-              <a:t>2/23/2021</a:t>
+              <a:t>2/24/2021</a:t>
             </a:fld>
             <a:endParaRPr lang="en-US" dirty="0"/>
           </a:p>
@@ -4692,8 +4691,8 @@
         </p:blipFill>
         <p:spPr>
           <a:xfrm>
-            <a:off x="10628300" y="5622706"/>
-            <a:ext cx="1252216" cy="1252216"/>
+            <a:off x="10112579" y="5281839"/>
+            <a:ext cx="1637557" cy="1637557"/>
           </a:xfrm>
           <a:prstGeom prst="rect">
             <a:avLst/>
@@ -4846,1596 +4845,6 @@
 </file>
 
 <file path=ppt/slides/slide10.xml><?xml version="1.0" encoding="utf-8"?>
-<p:sld xmlns:a="http://schemas.openxmlformats.org/drawingml/2006/main" xmlns:r="http://schemas.openxmlformats.org/officeDocument/2006/relationships" xmlns:p="http://schemas.openxmlformats.org/presentationml/2006/main">
-  <p:cSld>
-    <p:spTree>
-      <p:nvGrpSpPr>
-        <p:cNvPr id="1" name=""/>
-        <p:cNvGrpSpPr/>
-        <p:nvPr/>
-      </p:nvGrpSpPr>
-      <p:grpSpPr>
-        <a:xfrm>
-          <a:off x="0" y="0"/>
-          <a:ext cx="0" cy="0"/>
-          <a:chOff x="0" y="0"/>
-          <a:chExt cx="0" cy="0"/>
-        </a:xfrm>
-      </p:grpSpPr>
-      <p:grpSp>
-        <p:nvGrpSpPr>
-          <p:cNvPr id="13" name="Grupo 12">
-            <a:extLst>
-              <a:ext uri="{FF2B5EF4-FFF2-40B4-BE49-F238E27FC236}">
-                <a16:creationId xmlns:a16="http://schemas.microsoft.com/office/drawing/2014/main" id="{096A5902-9744-4AC3-9700-70E13FAE4EF8}"/>
-              </a:ext>
-            </a:extLst>
-          </p:cNvPr>
-          <p:cNvGrpSpPr/>
-          <p:nvPr/>
-        </p:nvGrpSpPr>
-        <p:grpSpPr>
-          <a:xfrm>
-            <a:off x="1220202" y="389379"/>
-            <a:ext cx="2229972" cy="669574"/>
-            <a:chOff x="1010052" y="253465"/>
-            <a:chExt cx="2229972" cy="669574"/>
-          </a:xfrm>
-        </p:grpSpPr>
-        <p:grpSp>
-          <p:nvGrpSpPr>
-            <p:cNvPr id="14" name="Header Artwork" descr="&quot;&quot;" title="Gráfico del título">
-              <a:extLst>
-                <a:ext uri="{FF2B5EF4-FFF2-40B4-BE49-F238E27FC236}">
-                  <a16:creationId xmlns:a16="http://schemas.microsoft.com/office/drawing/2014/main" id="{B1AC7219-10DD-414B-B171-7DB4620CCDC9}"/>
-                </a:ext>
-              </a:extLst>
-            </p:cNvPr>
-            <p:cNvGrpSpPr/>
-            <p:nvPr/>
-          </p:nvGrpSpPr>
-          <p:grpSpPr bwMode="auto">
-            <a:xfrm>
-              <a:off x="1010052" y="298492"/>
-              <a:ext cx="2229972" cy="517525"/>
-              <a:chOff x="0" y="0"/>
-              <a:chExt cx="154" cy="53"/>
-            </a:xfrm>
-            <a:solidFill>
-              <a:schemeClr val="accent5">
-                <a:lumMod val="40000"/>
-                <a:lumOff val="60000"/>
-              </a:schemeClr>
-            </a:solidFill>
-          </p:grpSpPr>
-          <p:sp>
-            <p:nvSpPr>
-              <p:cNvPr id="16" name="Freeform 5">
-                <a:extLst>
-                  <a:ext uri="{FF2B5EF4-FFF2-40B4-BE49-F238E27FC236}">
-                    <a16:creationId xmlns:a16="http://schemas.microsoft.com/office/drawing/2014/main" id="{5484981B-7E4B-4867-964E-6C6285DFF840}"/>
-                  </a:ext>
-                </a:extLst>
-              </p:cNvPr>
-              <p:cNvSpPr>
-                <a:spLocks/>
-              </p:cNvSpPr>
-              <p:nvPr/>
-            </p:nvSpPr>
-            <p:spPr bwMode="auto">
-              <a:xfrm>
-                <a:off x="0" y="0"/>
-                <a:ext cx="46" cy="53"/>
-              </a:xfrm>
-              <a:custGeom>
-                <a:avLst/>
-                <a:gdLst>
-                  <a:gd name="T0" fmla="*/ 0 w 1022"/>
-                  <a:gd name="T1" fmla="*/ 0 h 1161"/>
-                  <a:gd name="T2" fmla="*/ 1022 w 1022"/>
-                  <a:gd name="T3" fmla="*/ 0 h 1161"/>
-                  <a:gd name="T4" fmla="*/ 570 w 1022"/>
-                  <a:gd name="T5" fmla="*/ 1161 h 1161"/>
-                  <a:gd name="T6" fmla="*/ 0 w 1022"/>
-                  <a:gd name="T7" fmla="*/ 1161 h 1161"/>
-                  <a:gd name="T8" fmla="*/ 0 w 1022"/>
-                  <a:gd name="T9" fmla="*/ 0 h 1161"/>
-                </a:gdLst>
-                <a:ahLst/>
-                <a:cxnLst>
-                  <a:cxn ang="0">
-                    <a:pos x="T0" y="T1"/>
-                  </a:cxn>
-                  <a:cxn ang="0">
-                    <a:pos x="T2" y="T3"/>
-                  </a:cxn>
-                  <a:cxn ang="0">
-                    <a:pos x="T4" y="T5"/>
-                  </a:cxn>
-                  <a:cxn ang="0">
-                    <a:pos x="T6" y="T7"/>
-                  </a:cxn>
-                  <a:cxn ang="0">
-                    <a:pos x="T8" y="T9"/>
-                  </a:cxn>
-                </a:cxnLst>
-                <a:rect l="0" t="0" r="r" b="b"/>
-                <a:pathLst>
-                  <a:path w="1022" h="1161">
-                    <a:moveTo>
-                      <a:pt x="0" y="0"/>
-                    </a:moveTo>
-                    <a:lnTo>
-                      <a:pt x="1022" y="0"/>
-                    </a:lnTo>
-                    <a:lnTo>
-                      <a:pt x="570" y="1161"/>
-                    </a:lnTo>
-                    <a:lnTo>
-                      <a:pt x="0" y="1161"/>
-                    </a:lnTo>
-                    <a:lnTo>
-                      <a:pt x="0" y="0"/>
-                    </a:lnTo>
-                    <a:close/>
-                  </a:path>
-                </a:pathLst>
-              </a:custGeom>
-              <a:ln>
-                <a:headEnd/>
-                <a:tailEnd/>
-              </a:ln>
-            </p:spPr>
-            <p:style>
-              <a:lnRef idx="2">
-                <a:schemeClr val="accent6">
-                  <a:shade val="50000"/>
-                </a:schemeClr>
-              </a:lnRef>
-              <a:fillRef idx="1">
-                <a:schemeClr val="accent6"/>
-              </a:fillRef>
-              <a:effectRef idx="0">
-                <a:schemeClr val="accent6"/>
-              </a:effectRef>
-              <a:fontRef idx="minor">
-                <a:schemeClr val="lt1"/>
-              </a:fontRef>
-            </p:style>
-            <p:txBody>
-              <a:bodyPr/>
-              <a:lstStyle/>
-              <a:p>
-                <a:endParaRPr lang="es-PE"/>
-              </a:p>
-            </p:txBody>
-          </p:sp>
-          <p:sp>
-            <p:nvSpPr>
-              <p:cNvPr id="17" name="Freeform 6">
-                <a:extLst>
-                  <a:ext uri="{FF2B5EF4-FFF2-40B4-BE49-F238E27FC236}">
-                    <a16:creationId xmlns:a16="http://schemas.microsoft.com/office/drawing/2014/main" id="{DC6D10AF-9C43-4D48-8E39-9559EF9A3C67}"/>
-                  </a:ext>
-                </a:extLst>
-              </p:cNvPr>
-              <p:cNvSpPr>
-                <a:spLocks/>
-              </p:cNvSpPr>
-              <p:nvPr/>
-            </p:nvSpPr>
-            <p:spPr bwMode="auto">
-              <a:xfrm>
-                <a:off x="39" y="0"/>
-                <a:ext cx="34" cy="53"/>
-              </a:xfrm>
-              <a:custGeom>
-                <a:avLst/>
-                <a:gdLst>
-                  <a:gd name="T0" fmla="*/ 452 w 748"/>
-                  <a:gd name="T1" fmla="*/ 0 h 1161"/>
-                  <a:gd name="T2" fmla="*/ 748 w 748"/>
-                  <a:gd name="T3" fmla="*/ 0 h 1161"/>
-                  <a:gd name="T4" fmla="*/ 296 w 748"/>
-                  <a:gd name="T5" fmla="*/ 1161 h 1161"/>
-                  <a:gd name="T6" fmla="*/ 0 w 748"/>
-                  <a:gd name="T7" fmla="*/ 1161 h 1161"/>
-                  <a:gd name="T8" fmla="*/ 452 w 748"/>
-                  <a:gd name="T9" fmla="*/ 0 h 1161"/>
-                </a:gdLst>
-                <a:ahLst/>
-                <a:cxnLst>
-                  <a:cxn ang="0">
-                    <a:pos x="T0" y="T1"/>
-                  </a:cxn>
-                  <a:cxn ang="0">
-                    <a:pos x="T2" y="T3"/>
-                  </a:cxn>
-                  <a:cxn ang="0">
-                    <a:pos x="T4" y="T5"/>
-                  </a:cxn>
-                  <a:cxn ang="0">
-                    <a:pos x="T6" y="T7"/>
-                  </a:cxn>
-                  <a:cxn ang="0">
-                    <a:pos x="T8" y="T9"/>
-                  </a:cxn>
-                </a:cxnLst>
-                <a:rect l="0" t="0" r="r" b="b"/>
-                <a:pathLst>
-                  <a:path w="748" h="1161">
-                    <a:moveTo>
-                      <a:pt x="452" y="0"/>
-                    </a:moveTo>
-                    <a:lnTo>
-                      <a:pt x="748" y="0"/>
-                    </a:lnTo>
-                    <a:lnTo>
-                      <a:pt x="296" y="1161"/>
-                    </a:lnTo>
-                    <a:lnTo>
-                      <a:pt x="0" y="1161"/>
-                    </a:lnTo>
-                    <a:lnTo>
-                      <a:pt x="452" y="0"/>
-                    </a:lnTo>
-                    <a:close/>
-                  </a:path>
-                </a:pathLst>
-              </a:custGeom>
-              <a:ln>
-                <a:headEnd/>
-                <a:tailEnd/>
-              </a:ln>
-            </p:spPr>
-            <p:style>
-              <a:lnRef idx="2">
-                <a:schemeClr val="accent6">
-                  <a:shade val="50000"/>
-                </a:schemeClr>
-              </a:lnRef>
-              <a:fillRef idx="1">
-                <a:schemeClr val="accent6"/>
-              </a:fillRef>
-              <a:effectRef idx="0">
-                <a:schemeClr val="accent6"/>
-              </a:effectRef>
-              <a:fontRef idx="minor">
-                <a:schemeClr val="lt1"/>
-              </a:fontRef>
-            </p:style>
-            <p:txBody>
-              <a:bodyPr/>
-              <a:lstStyle/>
-              <a:p>
-                <a:endParaRPr lang="es-PE"/>
-              </a:p>
-            </p:txBody>
-          </p:sp>
-          <p:sp>
-            <p:nvSpPr>
-              <p:cNvPr id="18" name="Freeform 7">
-                <a:extLst>
-                  <a:ext uri="{FF2B5EF4-FFF2-40B4-BE49-F238E27FC236}">
-                    <a16:creationId xmlns:a16="http://schemas.microsoft.com/office/drawing/2014/main" id="{4CFED28E-43A9-45B8-BAC1-462956DFBD51}"/>
-                  </a:ext>
-                </a:extLst>
-              </p:cNvPr>
-              <p:cNvSpPr>
-                <a:spLocks/>
-              </p:cNvSpPr>
-              <p:nvPr/>
-            </p:nvSpPr>
-            <p:spPr bwMode="auto">
-              <a:xfrm>
-                <a:off x="66" y="0"/>
-                <a:ext cx="34" cy="53"/>
-              </a:xfrm>
-              <a:custGeom>
-                <a:avLst/>
-                <a:gdLst>
-                  <a:gd name="T0" fmla="*/ 453 w 749"/>
-                  <a:gd name="T1" fmla="*/ 0 h 1161"/>
-                  <a:gd name="T2" fmla="*/ 749 w 749"/>
-                  <a:gd name="T3" fmla="*/ 0 h 1161"/>
-                  <a:gd name="T4" fmla="*/ 297 w 749"/>
-                  <a:gd name="T5" fmla="*/ 1161 h 1161"/>
-                  <a:gd name="T6" fmla="*/ 0 w 749"/>
-                  <a:gd name="T7" fmla="*/ 1161 h 1161"/>
-                  <a:gd name="T8" fmla="*/ 453 w 749"/>
-                  <a:gd name="T9" fmla="*/ 0 h 1161"/>
-                </a:gdLst>
-                <a:ahLst/>
-                <a:cxnLst>
-                  <a:cxn ang="0">
-                    <a:pos x="T0" y="T1"/>
-                  </a:cxn>
-                  <a:cxn ang="0">
-                    <a:pos x="T2" y="T3"/>
-                  </a:cxn>
-                  <a:cxn ang="0">
-                    <a:pos x="T4" y="T5"/>
-                  </a:cxn>
-                  <a:cxn ang="0">
-                    <a:pos x="T6" y="T7"/>
-                  </a:cxn>
-                  <a:cxn ang="0">
-                    <a:pos x="T8" y="T9"/>
-                  </a:cxn>
-                </a:cxnLst>
-                <a:rect l="0" t="0" r="r" b="b"/>
-                <a:pathLst>
-                  <a:path w="749" h="1161">
-                    <a:moveTo>
-                      <a:pt x="453" y="0"/>
-                    </a:moveTo>
-                    <a:lnTo>
-                      <a:pt x="749" y="0"/>
-                    </a:lnTo>
-                    <a:lnTo>
-                      <a:pt x="297" y="1161"/>
-                    </a:lnTo>
-                    <a:lnTo>
-                      <a:pt x="0" y="1161"/>
-                    </a:lnTo>
-                    <a:lnTo>
-                      <a:pt x="453" y="0"/>
-                    </a:lnTo>
-                    <a:close/>
-                  </a:path>
-                </a:pathLst>
-              </a:custGeom>
-              <a:ln>
-                <a:headEnd/>
-                <a:tailEnd/>
-              </a:ln>
-            </p:spPr>
-            <p:style>
-              <a:lnRef idx="2">
-                <a:schemeClr val="accent6">
-                  <a:shade val="50000"/>
-                </a:schemeClr>
-              </a:lnRef>
-              <a:fillRef idx="1">
-                <a:schemeClr val="accent6"/>
-              </a:fillRef>
-              <a:effectRef idx="0">
-                <a:schemeClr val="accent6"/>
-              </a:effectRef>
-              <a:fontRef idx="minor">
-                <a:schemeClr val="lt1"/>
-              </a:fontRef>
-            </p:style>
-            <p:txBody>
-              <a:bodyPr/>
-              <a:lstStyle/>
-              <a:p>
-                <a:endParaRPr lang="es-PE"/>
-              </a:p>
-            </p:txBody>
-          </p:sp>
-          <p:sp>
-            <p:nvSpPr>
-              <p:cNvPr id="19" name="Freeform 8">
-                <a:extLst>
-                  <a:ext uri="{FF2B5EF4-FFF2-40B4-BE49-F238E27FC236}">
-                    <a16:creationId xmlns:a16="http://schemas.microsoft.com/office/drawing/2014/main" id="{32EDEE51-D66B-4564-ACBA-B3371EFE67E8}"/>
-                  </a:ext>
-                </a:extLst>
-              </p:cNvPr>
-              <p:cNvSpPr>
-                <a:spLocks/>
-              </p:cNvSpPr>
-              <p:nvPr/>
-            </p:nvSpPr>
-            <p:spPr bwMode="auto">
-              <a:xfrm>
-                <a:off x="93" y="0"/>
-                <a:ext cx="34" cy="53"/>
-              </a:xfrm>
-              <a:custGeom>
-                <a:avLst/>
-                <a:gdLst>
-                  <a:gd name="T0" fmla="*/ 453 w 749"/>
-                  <a:gd name="T1" fmla="*/ 0 h 1161"/>
-                  <a:gd name="T2" fmla="*/ 749 w 749"/>
-                  <a:gd name="T3" fmla="*/ 0 h 1161"/>
-                  <a:gd name="T4" fmla="*/ 297 w 749"/>
-                  <a:gd name="T5" fmla="*/ 1161 h 1161"/>
-                  <a:gd name="T6" fmla="*/ 0 w 749"/>
-                  <a:gd name="T7" fmla="*/ 1161 h 1161"/>
-                  <a:gd name="T8" fmla="*/ 453 w 749"/>
-                  <a:gd name="T9" fmla="*/ 0 h 1161"/>
-                </a:gdLst>
-                <a:ahLst/>
-                <a:cxnLst>
-                  <a:cxn ang="0">
-                    <a:pos x="T0" y="T1"/>
-                  </a:cxn>
-                  <a:cxn ang="0">
-                    <a:pos x="T2" y="T3"/>
-                  </a:cxn>
-                  <a:cxn ang="0">
-                    <a:pos x="T4" y="T5"/>
-                  </a:cxn>
-                  <a:cxn ang="0">
-                    <a:pos x="T6" y="T7"/>
-                  </a:cxn>
-                  <a:cxn ang="0">
-                    <a:pos x="T8" y="T9"/>
-                  </a:cxn>
-                </a:cxnLst>
-                <a:rect l="0" t="0" r="r" b="b"/>
-                <a:pathLst>
-                  <a:path w="749" h="1161">
-                    <a:moveTo>
-                      <a:pt x="453" y="0"/>
-                    </a:moveTo>
-                    <a:lnTo>
-                      <a:pt x="749" y="0"/>
-                    </a:lnTo>
-                    <a:lnTo>
-                      <a:pt x="297" y="1161"/>
-                    </a:lnTo>
-                    <a:lnTo>
-                      <a:pt x="0" y="1161"/>
-                    </a:lnTo>
-                    <a:lnTo>
-                      <a:pt x="453" y="0"/>
-                    </a:lnTo>
-                    <a:close/>
-                  </a:path>
-                </a:pathLst>
-              </a:custGeom>
-              <a:ln>
-                <a:headEnd/>
-                <a:tailEnd/>
-              </a:ln>
-            </p:spPr>
-            <p:style>
-              <a:lnRef idx="2">
-                <a:schemeClr val="accent6">
-                  <a:shade val="50000"/>
-                </a:schemeClr>
-              </a:lnRef>
-              <a:fillRef idx="1">
-                <a:schemeClr val="accent6"/>
-              </a:fillRef>
-              <a:effectRef idx="0">
-                <a:schemeClr val="accent6"/>
-              </a:effectRef>
-              <a:fontRef idx="minor">
-                <a:schemeClr val="lt1"/>
-              </a:fontRef>
-            </p:style>
-            <p:txBody>
-              <a:bodyPr/>
-              <a:lstStyle/>
-              <a:p>
-                <a:endParaRPr lang="es-PE"/>
-              </a:p>
-            </p:txBody>
-          </p:sp>
-          <p:sp>
-            <p:nvSpPr>
-              <p:cNvPr id="20" name="Freeform 9">
-                <a:extLst>
-                  <a:ext uri="{FF2B5EF4-FFF2-40B4-BE49-F238E27FC236}">
-                    <a16:creationId xmlns:a16="http://schemas.microsoft.com/office/drawing/2014/main" id="{BFF101D5-551C-47C5-9E37-9351944CF712}"/>
-                  </a:ext>
-                </a:extLst>
-              </p:cNvPr>
-              <p:cNvSpPr>
-                <a:spLocks/>
-              </p:cNvSpPr>
-              <p:nvPr/>
-            </p:nvSpPr>
-            <p:spPr bwMode="auto">
-              <a:xfrm>
-                <a:off x="120" y="0"/>
-                <a:ext cx="34" cy="53"/>
-              </a:xfrm>
-              <a:custGeom>
-                <a:avLst/>
-                <a:gdLst>
-                  <a:gd name="T0" fmla="*/ 452 w 748"/>
-                  <a:gd name="T1" fmla="*/ 0 h 1161"/>
-                  <a:gd name="T2" fmla="*/ 748 w 748"/>
-                  <a:gd name="T3" fmla="*/ 0 h 1161"/>
-                  <a:gd name="T4" fmla="*/ 297 w 748"/>
-                  <a:gd name="T5" fmla="*/ 1161 h 1161"/>
-                  <a:gd name="T6" fmla="*/ 0 w 748"/>
-                  <a:gd name="T7" fmla="*/ 1161 h 1161"/>
-                  <a:gd name="T8" fmla="*/ 452 w 748"/>
-                  <a:gd name="T9" fmla="*/ 0 h 1161"/>
-                </a:gdLst>
-                <a:ahLst/>
-                <a:cxnLst>
-                  <a:cxn ang="0">
-                    <a:pos x="T0" y="T1"/>
-                  </a:cxn>
-                  <a:cxn ang="0">
-                    <a:pos x="T2" y="T3"/>
-                  </a:cxn>
-                  <a:cxn ang="0">
-                    <a:pos x="T4" y="T5"/>
-                  </a:cxn>
-                  <a:cxn ang="0">
-                    <a:pos x="T6" y="T7"/>
-                  </a:cxn>
-                  <a:cxn ang="0">
-                    <a:pos x="T8" y="T9"/>
-                  </a:cxn>
-                </a:cxnLst>
-                <a:rect l="0" t="0" r="r" b="b"/>
-                <a:pathLst>
-                  <a:path w="748" h="1161">
-                    <a:moveTo>
-                      <a:pt x="452" y="0"/>
-                    </a:moveTo>
-                    <a:lnTo>
-                      <a:pt x="748" y="0"/>
-                    </a:lnTo>
-                    <a:lnTo>
-                      <a:pt x="297" y="1161"/>
-                    </a:lnTo>
-                    <a:lnTo>
-                      <a:pt x="0" y="1161"/>
-                    </a:lnTo>
-                    <a:lnTo>
-                      <a:pt x="452" y="0"/>
-                    </a:lnTo>
-                    <a:close/>
-                  </a:path>
-                </a:pathLst>
-              </a:custGeom>
-              <a:ln>
-                <a:headEnd/>
-                <a:tailEnd/>
-              </a:ln>
-            </p:spPr>
-            <p:style>
-              <a:lnRef idx="2">
-                <a:schemeClr val="accent6">
-                  <a:shade val="50000"/>
-                </a:schemeClr>
-              </a:lnRef>
-              <a:fillRef idx="1">
-                <a:schemeClr val="accent6"/>
-              </a:fillRef>
-              <a:effectRef idx="0">
-                <a:schemeClr val="accent6"/>
-              </a:effectRef>
-              <a:fontRef idx="minor">
-                <a:schemeClr val="lt1"/>
-              </a:fontRef>
-            </p:style>
-            <p:txBody>
-              <a:bodyPr/>
-              <a:lstStyle/>
-              <a:p>
-                <a:endParaRPr lang="es-PE"/>
-              </a:p>
-            </p:txBody>
-          </p:sp>
-        </p:grpSp>
-        <p:pic>
-          <p:nvPicPr>
-            <p:cNvPr id="15" name="Gráfico 14" descr="Serpiente">
-              <a:extLst>
-                <a:ext uri="{FF2B5EF4-FFF2-40B4-BE49-F238E27FC236}">
-                  <a16:creationId xmlns:a16="http://schemas.microsoft.com/office/drawing/2014/main" id="{0F481CE1-26DE-4347-B98C-A93427872C02}"/>
-                </a:ext>
-              </a:extLst>
-            </p:cNvPr>
-            <p:cNvPicPr>
-              <a:picLocks noChangeAspect="1"/>
-            </p:cNvPicPr>
-            <p:nvPr/>
-          </p:nvPicPr>
-          <p:blipFill>
-            <a:blip r:embed="rId2">
-              <a:extLst>
-                <a:ext uri="{96DAC541-7B7A-43D3-8B79-37D633B846F1}">
-                  <asvg:svgBlip xmlns:asvg="http://schemas.microsoft.com/office/drawing/2016/SVG/main" r:embed="rId3"/>
-                </a:ext>
-              </a:extLst>
-            </a:blip>
-            <a:stretch>
-              <a:fillRect/>
-            </a:stretch>
-          </p:blipFill>
-          <p:spPr>
-            <a:xfrm rot="17878565" flipV="1">
-              <a:off x="1681236" y="253465"/>
-              <a:ext cx="669574" cy="669574"/>
-            </a:xfrm>
-            <a:prstGeom prst="rect">
-              <a:avLst/>
-            </a:prstGeom>
-          </p:spPr>
-        </p:pic>
-      </p:grpSp>
-      <p:sp>
-        <p:nvSpPr>
-          <p:cNvPr id="23" name="CuadroTexto 22">
-            <a:extLst>
-              <a:ext uri="{FF2B5EF4-FFF2-40B4-BE49-F238E27FC236}">
-                <a16:creationId xmlns:a16="http://schemas.microsoft.com/office/drawing/2014/main" id="{758310EE-8FBF-4E7F-A961-85FB3837D3F9}"/>
-              </a:ext>
-            </a:extLst>
-          </p:cNvPr>
-          <p:cNvSpPr txBox="1"/>
-          <p:nvPr/>
-        </p:nvSpPr>
-        <p:spPr>
-          <a:xfrm>
-            <a:off x="1721075" y="6309550"/>
-            <a:ext cx="8749849" cy="276999"/>
-          </a:xfrm>
-          <a:prstGeom prst="rect">
-            <a:avLst/>
-          </a:prstGeom>
-          <a:noFill/>
-        </p:spPr>
-        <p:txBody>
-          <a:bodyPr wrap="square" rtlCol="0">
-            <a:spAutoFit/>
-          </a:bodyPr>
-          <a:lstStyle/>
-          <a:p>
-            <a:pPr algn="ctr"/>
-            <a:r>
-              <a:rPr lang="es-PE" sz="1200" b="1" dirty="0">
-                <a:solidFill>
-                  <a:schemeClr val="accent6">
-                    <a:lumMod val="60000"/>
-                    <a:lumOff val="40000"/>
-                  </a:schemeClr>
-                </a:solidFill>
-              </a:rPr>
-              <a:t>https://github.com/MayumyCH/dsfem_datachallenge_monthly/blob/main/the_minion_game/the_minion_game.ipynb</a:t>
-            </a:r>
-          </a:p>
-        </p:txBody>
-      </p:sp>
-      <p:pic>
-        <p:nvPicPr>
-          <p:cNvPr id="21" name="Imagen 20">
-            <a:extLst>
-              <a:ext uri="{FF2B5EF4-FFF2-40B4-BE49-F238E27FC236}">
-                <a16:creationId xmlns:a16="http://schemas.microsoft.com/office/drawing/2014/main" id="{F15C9689-FF98-4B98-84EE-FA2745A4E0E3}"/>
-              </a:ext>
-            </a:extLst>
-          </p:cNvPr>
-          <p:cNvPicPr>
-            <a:picLocks noChangeAspect="1"/>
-          </p:cNvPicPr>
-          <p:nvPr/>
-        </p:nvPicPr>
-        <p:blipFill>
-          <a:blip r:embed="rId4"/>
-          <a:stretch>
-            <a:fillRect/>
-          </a:stretch>
-        </p:blipFill>
-        <p:spPr>
-          <a:xfrm>
-            <a:off x="10672628" y="-15934"/>
-            <a:ext cx="1262173" cy="1262173"/>
-          </a:xfrm>
-          <a:prstGeom prst="rect">
-            <a:avLst/>
-          </a:prstGeom>
-          <a:ln>
-            <a:noFill/>
-          </a:ln>
-          <a:effectLst>
-            <a:outerShdw blurRad="292100" dist="139700" dir="2700000" algn="tl" rotWithShape="0">
-              <a:srgbClr val="333333">
-                <a:alpha val="65000"/>
-              </a:srgbClr>
-            </a:outerShdw>
-          </a:effectLst>
-        </p:spPr>
-      </p:pic>
-      <p:sp>
-        <p:nvSpPr>
-          <p:cNvPr id="24" name="Título 1">
-            <a:extLst>
-              <a:ext uri="{FF2B5EF4-FFF2-40B4-BE49-F238E27FC236}">
-                <a16:creationId xmlns:a16="http://schemas.microsoft.com/office/drawing/2014/main" id="{3C50EA28-9EF4-44B9-9A38-582802914981}"/>
-              </a:ext>
-            </a:extLst>
-          </p:cNvPr>
-          <p:cNvSpPr txBox="1">
-            <a:spLocks/>
-          </p:cNvSpPr>
-          <p:nvPr/>
-        </p:nvSpPr>
-        <p:spPr>
-          <a:xfrm>
-            <a:off x="2813038" y="462256"/>
-            <a:ext cx="7958331" cy="523820"/>
-          </a:xfrm>
-          <a:prstGeom prst="rect">
-            <a:avLst/>
-          </a:prstGeom>
-        </p:spPr>
-        <p:txBody>
-          <a:bodyPr vert="horz" lIns="91440" tIns="45720" rIns="91440" bIns="45720" rtlCol="0" anchor="t">
-            <a:normAutofit lnSpcReduction="10000"/>
-          </a:bodyPr>
-          <a:lstStyle>
-            <a:lvl1pPr algn="r" defTabSz="914400" rtl="0" eaLnBrk="1" latinLnBrk="0" hangingPunct="1">
-              <a:lnSpc>
-                <a:spcPct val="90000"/>
-              </a:lnSpc>
-              <a:spcBef>
-                <a:spcPct val="0"/>
-              </a:spcBef>
-              <a:buNone/>
-              <a:defRPr sz="3400" b="0" i="0" kern="1200" cap="none">
-                <a:solidFill>
-                  <a:schemeClr val="tx1"/>
-                </a:solidFill>
-                <a:effectLst/>
-                <a:latin typeface="+mj-lt"/>
-                <a:ea typeface="+mj-ea"/>
-                <a:cs typeface="+mj-cs"/>
-              </a:defRPr>
-            </a:lvl1pPr>
-          </a:lstStyle>
-          <a:p>
-            <a:pPr algn="ctr"/>
-            <a:r>
-              <a:rPr lang="es-ES" b="1" dirty="0"/>
-              <a:t>Solución - Código</a:t>
-            </a:r>
-            <a:endParaRPr lang="es-PE" b="1" dirty="0"/>
-          </a:p>
-        </p:txBody>
-      </p:sp>
-      <p:pic>
-        <p:nvPicPr>
-          <p:cNvPr id="3" name="Imagen 2">
-            <a:extLst>
-              <a:ext uri="{FF2B5EF4-FFF2-40B4-BE49-F238E27FC236}">
-                <a16:creationId xmlns:a16="http://schemas.microsoft.com/office/drawing/2014/main" id="{2151B364-FCA4-4A56-B2B5-BD34DB0691CA}"/>
-              </a:ext>
-            </a:extLst>
-          </p:cNvPr>
-          <p:cNvPicPr>
-            <a:picLocks noChangeAspect="1"/>
-          </p:cNvPicPr>
-          <p:nvPr/>
-        </p:nvPicPr>
-        <p:blipFill>
-          <a:blip r:embed="rId5"/>
-          <a:stretch>
-            <a:fillRect/>
-          </a:stretch>
-        </p:blipFill>
-        <p:spPr>
-          <a:xfrm>
-            <a:off x="3941530" y="2310844"/>
-            <a:ext cx="4719132" cy="3351907"/>
-          </a:xfrm>
-          <a:prstGeom prst="rect">
-            <a:avLst/>
-          </a:prstGeom>
-        </p:spPr>
-      </p:pic>
-      <p:sp>
-        <p:nvSpPr>
-          <p:cNvPr id="25" name="CuadroTexto 24">
-            <a:extLst>
-              <a:ext uri="{FF2B5EF4-FFF2-40B4-BE49-F238E27FC236}">
-                <a16:creationId xmlns:a16="http://schemas.microsoft.com/office/drawing/2014/main" id="{36952D5A-09BF-424F-879F-0133A13A95A1}"/>
-              </a:ext>
-            </a:extLst>
-          </p:cNvPr>
-          <p:cNvSpPr txBox="1"/>
-          <p:nvPr/>
-        </p:nvSpPr>
-        <p:spPr>
-          <a:xfrm>
-            <a:off x="1220202" y="1689572"/>
-            <a:ext cx="3012644" cy="338554"/>
-          </a:xfrm>
-          <a:prstGeom prst="rect">
-            <a:avLst/>
-          </a:prstGeom>
-          <a:noFill/>
-        </p:spPr>
-        <p:txBody>
-          <a:bodyPr wrap="square">
-            <a:spAutoFit/>
-          </a:bodyPr>
-          <a:lstStyle/>
-          <a:p>
-            <a:r>
-              <a:rPr lang="es-PE" sz="1600" b="1" dirty="0">
-                <a:effectLst/>
-                <a:latin typeface="Open Sans" panose="020B0604020202020204" pitchFamily="34" charset="0"/>
-                <a:ea typeface="Open Sans" panose="020B0604020202020204" pitchFamily="34" charset="0"/>
-                <a:cs typeface="Open Sans" panose="020B0604020202020204" pitchFamily="34" charset="0"/>
-              </a:rPr>
-              <a:t>Concepto Previos</a:t>
-            </a:r>
-            <a:endParaRPr lang="es-PE" sz="1600" b="1" dirty="0">
-              <a:latin typeface="Open Sans" panose="020B0604020202020204" pitchFamily="34" charset="0"/>
-              <a:ea typeface="Open Sans" panose="020B0604020202020204" pitchFamily="34" charset="0"/>
-              <a:cs typeface="Open Sans" panose="020B0604020202020204" pitchFamily="34" charset="0"/>
-            </a:endParaRPr>
-          </a:p>
-        </p:txBody>
-      </p:sp>
-    </p:spTree>
-    <p:extLst>
-      <p:ext uri="{BB962C8B-B14F-4D97-AF65-F5344CB8AC3E}">
-        <p14:creationId xmlns:p14="http://schemas.microsoft.com/office/powerpoint/2010/main" val="2296202469"/>
-      </p:ext>
-    </p:extLst>
-  </p:cSld>
-  <p:clrMapOvr>
-    <a:masterClrMapping/>
-  </p:clrMapOvr>
-</p:sld>
-</file>
-
-<file path=ppt/slides/slide11.xml><?xml version="1.0" encoding="utf-8"?>
-<p:sld xmlns:a="http://schemas.openxmlformats.org/drawingml/2006/main" xmlns:r="http://schemas.openxmlformats.org/officeDocument/2006/relationships" xmlns:p="http://schemas.openxmlformats.org/presentationml/2006/main">
-  <p:cSld>
-    <p:spTree>
-      <p:nvGrpSpPr>
-        <p:cNvPr id="1" name=""/>
-        <p:cNvGrpSpPr/>
-        <p:nvPr/>
-      </p:nvGrpSpPr>
-      <p:grpSpPr>
-        <a:xfrm>
-          <a:off x="0" y="0"/>
-          <a:ext cx="0" cy="0"/>
-          <a:chOff x="0" y="0"/>
-          <a:chExt cx="0" cy="0"/>
-        </a:xfrm>
-      </p:grpSpPr>
-      <p:pic>
-        <p:nvPicPr>
-          <p:cNvPr id="4" name="Imagen 3">
-            <a:extLst>
-              <a:ext uri="{FF2B5EF4-FFF2-40B4-BE49-F238E27FC236}">
-                <a16:creationId xmlns:a16="http://schemas.microsoft.com/office/drawing/2014/main" id="{1CDB8CD7-7205-437B-A42F-90E8048CDC3E}"/>
-              </a:ext>
-            </a:extLst>
-          </p:cNvPr>
-          <p:cNvPicPr>
-            <a:picLocks noChangeAspect="1"/>
-          </p:cNvPicPr>
-          <p:nvPr/>
-        </p:nvPicPr>
-        <p:blipFill>
-          <a:blip r:embed="rId2"/>
-          <a:stretch>
-            <a:fillRect/>
-          </a:stretch>
-        </p:blipFill>
-        <p:spPr>
-          <a:xfrm>
-            <a:off x="10971798" y="190230"/>
-            <a:ext cx="1005875" cy="1005875"/>
-          </a:xfrm>
-          <a:prstGeom prst="rect">
-            <a:avLst/>
-          </a:prstGeom>
-          <a:ln>
-            <a:noFill/>
-          </a:ln>
-          <a:effectLst>
-            <a:outerShdw blurRad="292100" dist="139700" dir="2700000" algn="tl" rotWithShape="0">
-              <a:srgbClr val="333333">
-                <a:alpha val="65000"/>
-              </a:srgbClr>
-            </a:outerShdw>
-          </a:effectLst>
-        </p:spPr>
-      </p:pic>
-      <p:grpSp>
-        <p:nvGrpSpPr>
-          <p:cNvPr id="13" name="Grupo 12">
-            <a:extLst>
-              <a:ext uri="{FF2B5EF4-FFF2-40B4-BE49-F238E27FC236}">
-                <a16:creationId xmlns:a16="http://schemas.microsoft.com/office/drawing/2014/main" id="{096A5902-9744-4AC3-9700-70E13FAE4EF8}"/>
-              </a:ext>
-            </a:extLst>
-          </p:cNvPr>
-          <p:cNvGrpSpPr/>
-          <p:nvPr/>
-        </p:nvGrpSpPr>
-        <p:grpSpPr>
-          <a:xfrm>
-            <a:off x="1220202" y="389379"/>
-            <a:ext cx="2229972" cy="669574"/>
-            <a:chOff x="1010052" y="253465"/>
-            <a:chExt cx="2229972" cy="669574"/>
-          </a:xfrm>
-        </p:grpSpPr>
-        <p:grpSp>
-          <p:nvGrpSpPr>
-            <p:cNvPr id="14" name="Header Artwork" descr="&quot;&quot;" title="Gráfico del título">
-              <a:extLst>
-                <a:ext uri="{FF2B5EF4-FFF2-40B4-BE49-F238E27FC236}">
-                  <a16:creationId xmlns:a16="http://schemas.microsoft.com/office/drawing/2014/main" id="{B1AC7219-10DD-414B-B171-7DB4620CCDC9}"/>
-                </a:ext>
-              </a:extLst>
-            </p:cNvPr>
-            <p:cNvGrpSpPr/>
-            <p:nvPr/>
-          </p:nvGrpSpPr>
-          <p:grpSpPr bwMode="auto">
-            <a:xfrm>
-              <a:off x="1010052" y="298492"/>
-              <a:ext cx="2229972" cy="517525"/>
-              <a:chOff x="0" y="0"/>
-              <a:chExt cx="154" cy="53"/>
-            </a:xfrm>
-            <a:solidFill>
-              <a:schemeClr val="accent5">
-                <a:lumMod val="40000"/>
-                <a:lumOff val="60000"/>
-              </a:schemeClr>
-            </a:solidFill>
-          </p:grpSpPr>
-          <p:sp>
-            <p:nvSpPr>
-              <p:cNvPr id="16" name="Freeform 5">
-                <a:extLst>
-                  <a:ext uri="{FF2B5EF4-FFF2-40B4-BE49-F238E27FC236}">
-                    <a16:creationId xmlns:a16="http://schemas.microsoft.com/office/drawing/2014/main" id="{5484981B-7E4B-4867-964E-6C6285DFF840}"/>
-                  </a:ext>
-                </a:extLst>
-              </p:cNvPr>
-              <p:cNvSpPr>
-                <a:spLocks/>
-              </p:cNvSpPr>
-              <p:nvPr/>
-            </p:nvSpPr>
-            <p:spPr bwMode="auto">
-              <a:xfrm>
-                <a:off x="0" y="0"/>
-                <a:ext cx="46" cy="53"/>
-              </a:xfrm>
-              <a:custGeom>
-                <a:avLst/>
-                <a:gdLst>
-                  <a:gd name="T0" fmla="*/ 0 w 1022"/>
-                  <a:gd name="T1" fmla="*/ 0 h 1161"/>
-                  <a:gd name="T2" fmla="*/ 1022 w 1022"/>
-                  <a:gd name="T3" fmla="*/ 0 h 1161"/>
-                  <a:gd name="T4" fmla="*/ 570 w 1022"/>
-                  <a:gd name="T5" fmla="*/ 1161 h 1161"/>
-                  <a:gd name="T6" fmla="*/ 0 w 1022"/>
-                  <a:gd name="T7" fmla="*/ 1161 h 1161"/>
-                  <a:gd name="T8" fmla="*/ 0 w 1022"/>
-                  <a:gd name="T9" fmla="*/ 0 h 1161"/>
-                </a:gdLst>
-                <a:ahLst/>
-                <a:cxnLst>
-                  <a:cxn ang="0">
-                    <a:pos x="T0" y="T1"/>
-                  </a:cxn>
-                  <a:cxn ang="0">
-                    <a:pos x="T2" y="T3"/>
-                  </a:cxn>
-                  <a:cxn ang="0">
-                    <a:pos x="T4" y="T5"/>
-                  </a:cxn>
-                  <a:cxn ang="0">
-                    <a:pos x="T6" y="T7"/>
-                  </a:cxn>
-                  <a:cxn ang="0">
-                    <a:pos x="T8" y="T9"/>
-                  </a:cxn>
-                </a:cxnLst>
-                <a:rect l="0" t="0" r="r" b="b"/>
-                <a:pathLst>
-                  <a:path w="1022" h="1161">
-                    <a:moveTo>
-                      <a:pt x="0" y="0"/>
-                    </a:moveTo>
-                    <a:lnTo>
-                      <a:pt x="1022" y="0"/>
-                    </a:lnTo>
-                    <a:lnTo>
-                      <a:pt x="570" y="1161"/>
-                    </a:lnTo>
-                    <a:lnTo>
-                      <a:pt x="0" y="1161"/>
-                    </a:lnTo>
-                    <a:lnTo>
-                      <a:pt x="0" y="0"/>
-                    </a:lnTo>
-                    <a:close/>
-                  </a:path>
-                </a:pathLst>
-              </a:custGeom>
-              <a:ln>
-                <a:headEnd/>
-                <a:tailEnd/>
-              </a:ln>
-            </p:spPr>
-            <p:style>
-              <a:lnRef idx="2">
-                <a:schemeClr val="accent6">
-                  <a:shade val="50000"/>
-                </a:schemeClr>
-              </a:lnRef>
-              <a:fillRef idx="1">
-                <a:schemeClr val="accent6"/>
-              </a:fillRef>
-              <a:effectRef idx="0">
-                <a:schemeClr val="accent6"/>
-              </a:effectRef>
-              <a:fontRef idx="minor">
-                <a:schemeClr val="lt1"/>
-              </a:fontRef>
-            </p:style>
-            <p:txBody>
-              <a:bodyPr/>
-              <a:lstStyle/>
-              <a:p>
-                <a:endParaRPr lang="es-PE"/>
-              </a:p>
-            </p:txBody>
-          </p:sp>
-          <p:sp>
-            <p:nvSpPr>
-              <p:cNvPr id="17" name="Freeform 6">
-                <a:extLst>
-                  <a:ext uri="{FF2B5EF4-FFF2-40B4-BE49-F238E27FC236}">
-                    <a16:creationId xmlns:a16="http://schemas.microsoft.com/office/drawing/2014/main" id="{DC6D10AF-9C43-4D48-8E39-9559EF9A3C67}"/>
-                  </a:ext>
-                </a:extLst>
-              </p:cNvPr>
-              <p:cNvSpPr>
-                <a:spLocks/>
-              </p:cNvSpPr>
-              <p:nvPr/>
-            </p:nvSpPr>
-            <p:spPr bwMode="auto">
-              <a:xfrm>
-                <a:off x="39" y="0"/>
-                <a:ext cx="34" cy="53"/>
-              </a:xfrm>
-              <a:custGeom>
-                <a:avLst/>
-                <a:gdLst>
-                  <a:gd name="T0" fmla="*/ 452 w 748"/>
-                  <a:gd name="T1" fmla="*/ 0 h 1161"/>
-                  <a:gd name="T2" fmla="*/ 748 w 748"/>
-                  <a:gd name="T3" fmla="*/ 0 h 1161"/>
-                  <a:gd name="T4" fmla="*/ 296 w 748"/>
-                  <a:gd name="T5" fmla="*/ 1161 h 1161"/>
-                  <a:gd name="T6" fmla="*/ 0 w 748"/>
-                  <a:gd name="T7" fmla="*/ 1161 h 1161"/>
-                  <a:gd name="T8" fmla="*/ 452 w 748"/>
-                  <a:gd name="T9" fmla="*/ 0 h 1161"/>
-                </a:gdLst>
-                <a:ahLst/>
-                <a:cxnLst>
-                  <a:cxn ang="0">
-                    <a:pos x="T0" y="T1"/>
-                  </a:cxn>
-                  <a:cxn ang="0">
-                    <a:pos x="T2" y="T3"/>
-                  </a:cxn>
-                  <a:cxn ang="0">
-                    <a:pos x="T4" y="T5"/>
-                  </a:cxn>
-                  <a:cxn ang="0">
-                    <a:pos x="T6" y="T7"/>
-                  </a:cxn>
-                  <a:cxn ang="0">
-                    <a:pos x="T8" y="T9"/>
-                  </a:cxn>
-                </a:cxnLst>
-                <a:rect l="0" t="0" r="r" b="b"/>
-                <a:pathLst>
-                  <a:path w="748" h="1161">
-                    <a:moveTo>
-                      <a:pt x="452" y="0"/>
-                    </a:moveTo>
-                    <a:lnTo>
-                      <a:pt x="748" y="0"/>
-                    </a:lnTo>
-                    <a:lnTo>
-                      <a:pt x="296" y="1161"/>
-                    </a:lnTo>
-                    <a:lnTo>
-                      <a:pt x="0" y="1161"/>
-                    </a:lnTo>
-                    <a:lnTo>
-                      <a:pt x="452" y="0"/>
-                    </a:lnTo>
-                    <a:close/>
-                  </a:path>
-                </a:pathLst>
-              </a:custGeom>
-              <a:ln>
-                <a:headEnd/>
-                <a:tailEnd/>
-              </a:ln>
-            </p:spPr>
-            <p:style>
-              <a:lnRef idx="2">
-                <a:schemeClr val="accent6">
-                  <a:shade val="50000"/>
-                </a:schemeClr>
-              </a:lnRef>
-              <a:fillRef idx="1">
-                <a:schemeClr val="accent6"/>
-              </a:fillRef>
-              <a:effectRef idx="0">
-                <a:schemeClr val="accent6"/>
-              </a:effectRef>
-              <a:fontRef idx="minor">
-                <a:schemeClr val="lt1"/>
-              </a:fontRef>
-            </p:style>
-            <p:txBody>
-              <a:bodyPr/>
-              <a:lstStyle/>
-              <a:p>
-                <a:endParaRPr lang="es-PE"/>
-              </a:p>
-            </p:txBody>
-          </p:sp>
-          <p:sp>
-            <p:nvSpPr>
-              <p:cNvPr id="18" name="Freeform 7">
-                <a:extLst>
-                  <a:ext uri="{FF2B5EF4-FFF2-40B4-BE49-F238E27FC236}">
-                    <a16:creationId xmlns:a16="http://schemas.microsoft.com/office/drawing/2014/main" id="{4CFED28E-43A9-45B8-BAC1-462956DFBD51}"/>
-                  </a:ext>
-                </a:extLst>
-              </p:cNvPr>
-              <p:cNvSpPr>
-                <a:spLocks/>
-              </p:cNvSpPr>
-              <p:nvPr/>
-            </p:nvSpPr>
-            <p:spPr bwMode="auto">
-              <a:xfrm>
-                <a:off x="66" y="0"/>
-                <a:ext cx="34" cy="53"/>
-              </a:xfrm>
-              <a:custGeom>
-                <a:avLst/>
-                <a:gdLst>
-                  <a:gd name="T0" fmla="*/ 453 w 749"/>
-                  <a:gd name="T1" fmla="*/ 0 h 1161"/>
-                  <a:gd name="T2" fmla="*/ 749 w 749"/>
-                  <a:gd name="T3" fmla="*/ 0 h 1161"/>
-                  <a:gd name="T4" fmla="*/ 297 w 749"/>
-                  <a:gd name="T5" fmla="*/ 1161 h 1161"/>
-                  <a:gd name="T6" fmla="*/ 0 w 749"/>
-                  <a:gd name="T7" fmla="*/ 1161 h 1161"/>
-                  <a:gd name="T8" fmla="*/ 453 w 749"/>
-                  <a:gd name="T9" fmla="*/ 0 h 1161"/>
-                </a:gdLst>
-                <a:ahLst/>
-                <a:cxnLst>
-                  <a:cxn ang="0">
-                    <a:pos x="T0" y="T1"/>
-                  </a:cxn>
-                  <a:cxn ang="0">
-                    <a:pos x="T2" y="T3"/>
-                  </a:cxn>
-                  <a:cxn ang="0">
-                    <a:pos x="T4" y="T5"/>
-                  </a:cxn>
-                  <a:cxn ang="0">
-                    <a:pos x="T6" y="T7"/>
-                  </a:cxn>
-                  <a:cxn ang="0">
-                    <a:pos x="T8" y="T9"/>
-                  </a:cxn>
-                </a:cxnLst>
-                <a:rect l="0" t="0" r="r" b="b"/>
-                <a:pathLst>
-                  <a:path w="749" h="1161">
-                    <a:moveTo>
-                      <a:pt x="453" y="0"/>
-                    </a:moveTo>
-                    <a:lnTo>
-                      <a:pt x="749" y="0"/>
-                    </a:lnTo>
-                    <a:lnTo>
-                      <a:pt x="297" y="1161"/>
-                    </a:lnTo>
-                    <a:lnTo>
-                      <a:pt x="0" y="1161"/>
-                    </a:lnTo>
-                    <a:lnTo>
-                      <a:pt x="453" y="0"/>
-                    </a:lnTo>
-                    <a:close/>
-                  </a:path>
-                </a:pathLst>
-              </a:custGeom>
-              <a:ln>
-                <a:headEnd/>
-                <a:tailEnd/>
-              </a:ln>
-            </p:spPr>
-            <p:style>
-              <a:lnRef idx="2">
-                <a:schemeClr val="accent6">
-                  <a:shade val="50000"/>
-                </a:schemeClr>
-              </a:lnRef>
-              <a:fillRef idx="1">
-                <a:schemeClr val="accent6"/>
-              </a:fillRef>
-              <a:effectRef idx="0">
-                <a:schemeClr val="accent6"/>
-              </a:effectRef>
-              <a:fontRef idx="minor">
-                <a:schemeClr val="lt1"/>
-              </a:fontRef>
-            </p:style>
-            <p:txBody>
-              <a:bodyPr/>
-              <a:lstStyle/>
-              <a:p>
-                <a:endParaRPr lang="es-PE"/>
-              </a:p>
-            </p:txBody>
-          </p:sp>
-          <p:sp>
-            <p:nvSpPr>
-              <p:cNvPr id="19" name="Freeform 8">
-                <a:extLst>
-                  <a:ext uri="{FF2B5EF4-FFF2-40B4-BE49-F238E27FC236}">
-                    <a16:creationId xmlns:a16="http://schemas.microsoft.com/office/drawing/2014/main" id="{32EDEE51-D66B-4564-ACBA-B3371EFE67E8}"/>
-                  </a:ext>
-                </a:extLst>
-              </p:cNvPr>
-              <p:cNvSpPr>
-                <a:spLocks/>
-              </p:cNvSpPr>
-              <p:nvPr/>
-            </p:nvSpPr>
-            <p:spPr bwMode="auto">
-              <a:xfrm>
-                <a:off x="93" y="0"/>
-                <a:ext cx="34" cy="53"/>
-              </a:xfrm>
-              <a:custGeom>
-                <a:avLst/>
-                <a:gdLst>
-                  <a:gd name="T0" fmla="*/ 453 w 749"/>
-                  <a:gd name="T1" fmla="*/ 0 h 1161"/>
-                  <a:gd name="T2" fmla="*/ 749 w 749"/>
-                  <a:gd name="T3" fmla="*/ 0 h 1161"/>
-                  <a:gd name="T4" fmla="*/ 297 w 749"/>
-                  <a:gd name="T5" fmla="*/ 1161 h 1161"/>
-                  <a:gd name="T6" fmla="*/ 0 w 749"/>
-                  <a:gd name="T7" fmla="*/ 1161 h 1161"/>
-                  <a:gd name="T8" fmla="*/ 453 w 749"/>
-                  <a:gd name="T9" fmla="*/ 0 h 1161"/>
-                </a:gdLst>
-                <a:ahLst/>
-                <a:cxnLst>
-                  <a:cxn ang="0">
-                    <a:pos x="T0" y="T1"/>
-                  </a:cxn>
-                  <a:cxn ang="0">
-                    <a:pos x="T2" y="T3"/>
-                  </a:cxn>
-                  <a:cxn ang="0">
-                    <a:pos x="T4" y="T5"/>
-                  </a:cxn>
-                  <a:cxn ang="0">
-                    <a:pos x="T6" y="T7"/>
-                  </a:cxn>
-                  <a:cxn ang="0">
-                    <a:pos x="T8" y="T9"/>
-                  </a:cxn>
-                </a:cxnLst>
-                <a:rect l="0" t="0" r="r" b="b"/>
-                <a:pathLst>
-                  <a:path w="749" h="1161">
-                    <a:moveTo>
-                      <a:pt x="453" y="0"/>
-                    </a:moveTo>
-                    <a:lnTo>
-                      <a:pt x="749" y="0"/>
-                    </a:lnTo>
-                    <a:lnTo>
-                      <a:pt x="297" y="1161"/>
-                    </a:lnTo>
-                    <a:lnTo>
-                      <a:pt x="0" y="1161"/>
-                    </a:lnTo>
-                    <a:lnTo>
-                      <a:pt x="453" y="0"/>
-                    </a:lnTo>
-                    <a:close/>
-                  </a:path>
-                </a:pathLst>
-              </a:custGeom>
-              <a:ln>
-                <a:headEnd/>
-                <a:tailEnd/>
-              </a:ln>
-            </p:spPr>
-            <p:style>
-              <a:lnRef idx="2">
-                <a:schemeClr val="accent6">
-                  <a:shade val="50000"/>
-                </a:schemeClr>
-              </a:lnRef>
-              <a:fillRef idx="1">
-                <a:schemeClr val="accent6"/>
-              </a:fillRef>
-              <a:effectRef idx="0">
-                <a:schemeClr val="accent6"/>
-              </a:effectRef>
-              <a:fontRef idx="minor">
-                <a:schemeClr val="lt1"/>
-              </a:fontRef>
-            </p:style>
-            <p:txBody>
-              <a:bodyPr/>
-              <a:lstStyle/>
-              <a:p>
-                <a:endParaRPr lang="es-PE"/>
-              </a:p>
-            </p:txBody>
-          </p:sp>
-          <p:sp>
-            <p:nvSpPr>
-              <p:cNvPr id="20" name="Freeform 9">
-                <a:extLst>
-                  <a:ext uri="{FF2B5EF4-FFF2-40B4-BE49-F238E27FC236}">
-                    <a16:creationId xmlns:a16="http://schemas.microsoft.com/office/drawing/2014/main" id="{BFF101D5-551C-47C5-9E37-9351944CF712}"/>
-                  </a:ext>
-                </a:extLst>
-              </p:cNvPr>
-              <p:cNvSpPr>
-                <a:spLocks/>
-              </p:cNvSpPr>
-              <p:nvPr/>
-            </p:nvSpPr>
-            <p:spPr bwMode="auto">
-              <a:xfrm>
-                <a:off x="120" y="0"/>
-                <a:ext cx="34" cy="53"/>
-              </a:xfrm>
-              <a:custGeom>
-                <a:avLst/>
-                <a:gdLst>
-                  <a:gd name="T0" fmla="*/ 452 w 748"/>
-                  <a:gd name="T1" fmla="*/ 0 h 1161"/>
-                  <a:gd name="T2" fmla="*/ 748 w 748"/>
-                  <a:gd name="T3" fmla="*/ 0 h 1161"/>
-                  <a:gd name="T4" fmla="*/ 297 w 748"/>
-                  <a:gd name="T5" fmla="*/ 1161 h 1161"/>
-                  <a:gd name="T6" fmla="*/ 0 w 748"/>
-                  <a:gd name="T7" fmla="*/ 1161 h 1161"/>
-                  <a:gd name="T8" fmla="*/ 452 w 748"/>
-                  <a:gd name="T9" fmla="*/ 0 h 1161"/>
-                </a:gdLst>
-                <a:ahLst/>
-                <a:cxnLst>
-                  <a:cxn ang="0">
-                    <a:pos x="T0" y="T1"/>
-                  </a:cxn>
-                  <a:cxn ang="0">
-                    <a:pos x="T2" y="T3"/>
-                  </a:cxn>
-                  <a:cxn ang="0">
-                    <a:pos x="T4" y="T5"/>
-                  </a:cxn>
-                  <a:cxn ang="0">
-                    <a:pos x="T6" y="T7"/>
-                  </a:cxn>
-                  <a:cxn ang="0">
-                    <a:pos x="T8" y="T9"/>
-                  </a:cxn>
-                </a:cxnLst>
-                <a:rect l="0" t="0" r="r" b="b"/>
-                <a:pathLst>
-                  <a:path w="748" h="1161">
-                    <a:moveTo>
-                      <a:pt x="452" y="0"/>
-                    </a:moveTo>
-                    <a:lnTo>
-                      <a:pt x="748" y="0"/>
-                    </a:lnTo>
-                    <a:lnTo>
-                      <a:pt x="297" y="1161"/>
-                    </a:lnTo>
-                    <a:lnTo>
-                      <a:pt x="0" y="1161"/>
-                    </a:lnTo>
-                    <a:lnTo>
-                      <a:pt x="452" y="0"/>
-                    </a:lnTo>
-                    <a:close/>
-                  </a:path>
-                </a:pathLst>
-              </a:custGeom>
-              <a:ln>
-                <a:headEnd/>
-                <a:tailEnd/>
-              </a:ln>
-            </p:spPr>
-            <p:style>
-              <a:lnRef idx="2">
-                <a:schemeClr val="accent6">
-                  <a:shade val="50000"/>
-                </a:schemeClr>
-              </a:lnRef>
-              <a:fillRef idx="1">
-                <a:schemeClr val="accent6"/>
-              </a:fillRef>
-              <a:effectRef idx="0">
-                <a:schemeClr val="accent6"/>
-              </a:effectRef>
-              <a:fontRef idx="minor">
-                <a:schemeClr val="lt1"/>
-              </a:fontRef>
-            </p:style>
-            <p:txBody>
-              <a:bodyPr/>
-              <a:lstStyle/>
-              <a:p>
-                <a:endParaRPr lang="es-PE"/>
-              </a:p>
-            </p:txBody>
-          </p:sp>
-        </p:grpSp>
-        <p:pic>
-          <p:nvPicPr>
-            <p:cNvPr id="15" name="Gráfico 14" descr="Serpiente">
-              <a:extLst>
-                <a:ext uri="{FF2B5EF4-FFF2-40B4-BE49-F238E27FC236}">
-                  <a16:creationId xmlns:a16="http://schemas.microsoft.com/office/drawing/2014/main" id="{0F481CE1-26DE-4347-B98C-A93427872C02}"/>
-                </a:ext>
-              </a:extLst>
-            </p:cNvPr>
-            <p:cNvPicPr>
-              <a:picLocks noChangeAspect="1"/>
-            </p:cNvPicPr>
-            <p:nvPr/>
-          </p:nvPicPr>
-          <p:blipFill>
-            <a:blip r:embed="rId3">
-              <a:extLst>
-                <a:ext uri="{96DAC541-7B7A-43D3-8B79-37D633B846F1}">
-                  <asvg:svgBlip xmlns:asvg="http://schemas.microsoft.com/office/drawing/2016/SVG/main" r:embed="rId4"/>
-                </a:ext>
-              </a:extLst>
-            </a:blip>
-            <a:stretch>
-              <a:fillRect/>
-            </a:stretch>
-          </p:blipFill>
-          <p:spPr>
-            <a:xfrm rot="17878565" flipV="1">
-              <a:off x="1681236" y="253465"/>
-              <a:ext cx="669574" cy="669574"/>
-            </a:xfrm>
-            <a:prstGeom prst="rect">
-              <a:avLst/>
-            </a:prstGeom>
-          </p:spPr>
-        </p:pic>
-      </p:grpSp>
-      <p:pic>
-        <p:nvPicPr>
-          <p:cNvPr id="3" name="Imagen 2">
-            <a:extLst>
-              <a:ext uri="{FF2B5EF4-FFF2-40B4-BE49-F238E27FC236}">
-                <a16:creationId xmlns:a16="http://schemas.microsoft.com/office/drawing/2014/main" id="{B8865558-BFBD-4B19-AD8F-977CDE4CFB54}"/>
-              </a:ext>
-            </a:extLst>
-          </p:cNvPr>
-          <p:cNvPicPr>
-            <a:picLocks noChangeAspect="1"/>
-          </p:cNvPicPr>
-          <p:nvPr/>
-        </p:nvPicPr>
-        <p:blipFill>
-          <a:blip r:embed="rId5"/>
-          <a:stretch>
-            <a:fillRect/>
-          </a:stretch>
-        </p:blipFill>
-        <p:spPr>
-          <a:xfrm>
-            <a:off x="3881235" y="951931"/>
-            <a:ext cx="7079910" cy="5535930"/>
-          </a:xfrm>
-          <a:prstGeom prst="rect">
-            <a:avLst/>
-          </a:prstGeom>
-        </p:spPr>
-      </p:pic>
-      <p:sp>
-        <p:nvSpPr>
-          <p:cNvPr id="21" name="Título 1">
-            <a:extLst>
-              <a:ext uri="{FF2B5EF4-FFF2-40B4-BE49-F238E27FC236}">
-                <a16:creationId xmlns:a16="http://schemas.microsoft.com/office/drawing/2014/main" id="{859E312F-6587-4C9A-AA63-1BB34C949C34}"/>
-              </a:ext>
-            </a:extLst>
-          </p:cNvPr>
-          <p:cNvSpPr txBox="1">
-            <a:spLocks/>
-          </p:cNvSpPr>
-          <p:nvPr/>
-        </p:nvSpPr>
-        <p:spPr>
-          <a:xfrm>
-            <a:off x="1039031" y="3284165"/>
-            <a:ext cx="2626674" cy="2908810"/>
-          </a:xfrm>
-          <a:prstGeom prst="rect">
-            <a:avLst/>
-          </a:prstGeom>
-        </p:spPr>
-        <p:txBody>
-          <a:bodyPr vert="horz" lIns="91440" tIns="45720" rIns="91440" bIns="45720" rtlCol="0" anchor="t">
-            <a:normAutofit/>
-          </a:bodyPr>
-          <a:lstStyle>
-            <a:lvl1pPr algn="r" defTabSz="914400" rtl="0" eaLnBrk="1" latinLnBrk="0" hangingPunct="1">
-              <a:lnSpc>
-                <a:spcPct val="90000"/>
-              </a:lnSpc>
-              <a:spcBef>
-                <a:spcPct val="0"/>
-              </a:spcBef>
-              <a:buNone/>
-              <a:defRPr sz="3400" b="0" i="0" kern="1200" cap="none">
-                <a:solidFill>
-                  <a:schemeClr val="tx1"/>
-                </a:solidFill>
-                <a:effectLst/>
-                <a:latin typeface="+mj-lt"/>
-                <a:ea typeface="+mj-ea"/>
-                <a:cs typeface="+mj-cs"/>
-              </a:defRPr>
-            </a:lvl1pPr>
-          </a:lstStyle>
-          <a:p>
-            <a:pPr algn="ctr"/>
-            <a:r>
-              <a:rPr lang="es-ES" b="1" dirty="0"/>
-              <a:t>Resolución completa</a:t>
-            </a:r>
-            <a:endParaRPr lang="es-PE" b="1" dirty="0"/>
-          </a:p>
-        </p:txBody>
-      </p:sp>
-    </p:spTree>
-    <p:extLst>
-      <p:ext uri="{BB962C8B-B14F-4D97-AF65-F5344CB8AC3E}">
-        <p14:creationId xmlns:p14="http://schemas.microsoft.com/office/powerpoint/2010/main" val="97831418"/>
-      </p:ext>
-    </p:extLst>
-  </p:cSld>
-  <p:clrMapOvr>
-    <a:masterClrMapping/>
-  </p:clrMapOvr>
-</p:sld>
-</file>
-
-<file path=ppt/slides/slide12.xml><?xml version="1.0" encoding="utf-8"?>
 <p:sld xmlns:a="http://schemas.openxmlformats.org/drawingml/2006/main" xmlns:r="http://schemas.openxmlformats.org/officeDocument/2006/relationships" xmlns:p="http://schemas.openxmlformats.org/presentationml/2006/main">
   <p:cSld>
     <p:spTree>
@@ -7216,7 +5625,7 @@
 </p:sld>
 </file>
 
-<file path=ppt/slides/slide13.xml><?xml version="1.0" encoding="utf-8"?>
+<file path=ppt/slides/slide11.xml><?xml version="1.0" encoding="utf-8"?>
 <p:sld xmlns:a="http://schemas.openxmlformats.org/drawingml/2006/main" xmlns:r="http://schemas.openxmlformats.org/officeDocument/2006/relationships" xmlns:p="http://schemas.openxmlformats.org/presentationml/2006/main">
   <p:cSld>
     <p:spTree>
@@ -7867,49 +6276,6 @@
           </p:spPr>
         </p:pic>
       </p:grpSp>
-      <p:sp>
-        <p:nvSpPr>
-          <p:cNvPr id="23" name="CuadroTexto 22">
-            <a:extLst>
-              <a:ext uri="{FF2B5EF4-FFF2-40B4-BE49-F238E27FC236}">
-                <a16:creationId xmlns:a16="http://schemas.microsoft.com/office/drawing/2014/main" id="{758310EE-8FBF-4E7F-A961-85FB3837D3F9}"/>
-              </a:ext>
-            </a:extLst>
-          </p:cNvPr>
-          <p:cNvSpPr txBox="1"/>
-          <p:nvPr/>
-        </p:nvSpPr>
-        <p:spPr>
-          <a:xfrm>
-            <a:off x="1721075" y="6114076"/>
-            <a:ext cx="8749849" cy="276999"/>
-          </a:xfrm>
-          <a:prstGeom prst="rect">
-            <a:avLst/>
-          </a:prstGeom>
-          <a:noFill/>
-        </p:spPr>
-        <p:txBody>
-          <a:bodyPr wrap="square" rtlCol="0">
-            <a:spAutoFit/>
-          </a:bodyPr>
-          <a:lstStyle/>
-          <a:p>
-            <a:pPr algn="ctr"/>
-            <a:r>
-              <a:rPr lang="es-PE" sz="1200" b="1" dirty="0">
-                <a:solidFill>
-                  <a:schemeClr val="accent6">
-                    <a:lumMod val="60000"/>
-                    <a:lumOff val="40000"/>
-                  </a:schemeClr>
-                </a:solidFill>
-              </a:rPr>
-              <a:t>https://github.com/MayumyCH/dsfem_datachallenge_monthly/blob/main/the_minion_game/the_minion_game.ipynb</a:t>
-            </a:r>
-          </a:p>
-        </p:txBody>
-      </p:sp>
       <p:pic>
         <p:nvPicPr>
           <p:cNvPr id="3" name="Imagen 2">
@@ -7932,7 +6298,7 @@
         </p:blipFill>
         <p:spPr>
           <a:xfrm>
-            <a:off x="1337508" y="1683244"/>
+            <a:off x="1337508" y="1817703"/>
             <a:ext cx="9634290" cy="3797093"/>
           </a:xfrm>
           <a:prstGeom prst="rect">
@@ -7997,6 +6363,58 @@
           </a:p>
         </p:txBody>
       </p:sp>
+      <p:sp>
+        <p:nvSpPr>
+          <p:cNvPr id="22" name="CuadroTexto 21">
+            <a:extLst>
+              <a:ext uri="{FF2B5EF4-FFF2-40B4-BE49-F238E27FC236}">
+                <a16:creationId xmlns:a16="http://schemas.microsoft.com/office/drawing/2014/main" id="{28C4A229-2F1D-486B-BA6A-E5C009A852BE}"/>
+              </a:ext>
+            </a:extLst>
+          </p:cNvPr>
+          <p:cNvSpPr txBox="1"/>
+          <p:nvPr/>
+        </p:nvSpPr>
+        <p:spPr>
+          <a:xfrm>
+            <a:off x="1721075" y="6309550"/>
+            <a:ext cx="8749849" cy="276999"/>
+          </a:xfrm>
+          <a:prstGeom prst="rect">
+            <a:avLst/>
+          </a:prstGeom>
+          <a:noFill/>
+        </p:spPr>
+        <p:txBody>
+          <a:bodyPr wrap="square" rtlCol="0">
+            <a:spAutoFit/>
+          </a:bodyPr>
+          <a:lstStyle/>
+          <a:p>
+            <a:pPr algn="ctr"/>
+            <a:r>
+              <a:rPr lang="es-PE" sz="1200" b="1" dirty="0">
+                <a:solidFill>
+                  <a:schemeClr val="accent6">
+                    <a:lumMod val="60000"/>
+                    <a:lumOff val="40000"/>
+                  </a:schemeClr>
+                </a:solidFill>
+                <a:hlinkClick r:id="rId6"/>
+              </a:rPr>
+              <a:t>https://github.com/MayumyCH/dsfem_datachallenge_monthly/blob/main/the_minion_game/the_minion_game.ipynb</a:t>
+            </a:r>
+            <a:endParaRPr lang="es-PE" sz="1200" b="1" dirty="0">
+              <a:solidFill>
+                <a:schemeClr val="accent6">
+                  <a:lumMod val="60000"/>
+                  <a:lumOff val="40000"/>
+                </a:schemeClr>
+              </a:solidFill>
+            </a:endParaRPr>
+          </a:p>
+        </p:txBody>
+      </p:sp>
     </p:spTree>
     <p:extLst>
       <p:ext uri="{BB962C8B-B14F-4D97-AF65-F5344CB8AC3E}">
@@ -8010,7 +6428,7 @@
 </p:sld>
 </file>
 
-<file path=ppt/slides/slide2.xml><?xml version="1.0" encoding="utf-8"?>
+<file path=ppt/slides/slide12.xml><?xml version="1.0" encoding="utf-8"?>
 <p:sld xmlns:a="http://schemas.openxmlformats.org/drawingml/2006/main" xmlns:r="http://schemas.openxmlformats.org/officeDocument/2006/relationships" xmlns:p="http://schemas.openxmlformats.org/presentationml/2006/main">
   <p:cSld>
     <p:spTree>
@@ -8029,81 +6447,91 @@
       </p:grpSpPr>
       <p:sp>
         <p:nvSpPr>
-          <p:cNvPr id="2" name="Título 1">
+          <p:cNvPr id="12" name="Cuadro de texto 2">
             <a:extLst>
               <a:ext uri="{FF2B5EF4-FFF2-40B4-BE49-F238E27FC236}">
-                <a16:creationId xmlns:a16="http://schemas.microsoft.com/office/drawing/2014/main" id="{16877AE7-6248-407C-A719-C19911673446}"/>
+                <a16:creationId xmlns:a16="http://schemas.microsoft.com/office/drawing/2014/main" id="{3993224C-E93C-4C8C-847E-68107B52D7B8}"/>
               </a:ext>
             </a:extLst>
           </p:cNvPr>
-          <p:cNvSpPr>
-            <a:spLocks noGrp="1"/>
+          <p:cNvSpPr txBox="1">
+            <a:spLocks noChangeArrowheads="1"/>
           </p:cNvSpPr>
-          <p:nvPr>
-            <p:ph type="title"/>
-          </p:nvPr>
+          <p:nvPr/>
         </p:nvSpPr>
-        <p:spPr>
+        <p:spPr bwMode="auto">
           <a:xfrm>
-            <a:off x="1807565" y="4861761"/>
-            <a:ext cx="8576870" cy="1238857"/>
+            <a:off x="1150684" y="6128111"/>
+            <a:ext cx="2257120" cy="447675"/>
           </a:xfrm>
+          <a:prstGeom prst="rect">
+            <a:avLst/>
+          </a:prstGeom>
+          <a:noFill/>
+          <a:ln w="9525">
+            <a:noFill/>
+            <a:miter lim="800000"/>
+            <a:headEnd/>
+            <a:tailEnd/>
+          </a:ln>
         </p:spPr>
         <p:txBody>
-          <a:bodyPr>
-            <a:normAutofit fontScale="90000"/>
+          <a:bodyPr rot="0" vert="horz" wrap="square" lIns="91440" tIns="45720" rIns="91440" bIns="45720" anchor="t" anchorCtr="0">
+            <a:noAutofit/>
           </a:bodyPr>
           <a:lstStyle/>
           <a:p>
-            <a:pPr algn="ctr"/>
-            <a:r>
-              <a:rPr lang="es-PE" dirty="0"/>
-              <a:t>CHALLENGE</a:t>
-            </a:r>
-            <a:br>
-              <a:rPr lang="es-ES" dirty="0"/>
-            </a:br>
-            <a:r>
-              <a:rPr lang="es-PE" dirty="0"/>
-              <a:t>“</a:t>
-            </a:r>
-            <a:r>
-              <a:rPr lang="es-PE" dirty="0" err="1"/>
-              <a:t>The</a:t>
-            </a:r>
-            <a:r>
-              <a:rPr lang="es-PE" dirty="0"/>
-              <a:t> </a:t>
-            </a:r>
-            <a:r>
-              <a:rPr lang="es-PE" dirty="0" err="1"/>
-              <a:t>Minion</a:t>
-            </a:r>
-            <a:r>
-              <a:rPr lang="es-PE" dirty="0"/>
-              <a:t> </a:t>
-            </a:r>
-            <a:r>
-              <a:rPr lang="es-PE" dirty="0" err="1"/>
-              <a:t>Game</a:t>
-            </a:r>
-            <a:r>
-              <a:rPr lang="es-PE" dirty="0"/>
-              <a:t>”</a:t>
-            </a:r>
-            <a:br>
-              <a:rPr lang="es-PE" dirty="0"/>
-            </a:br>
-            <a:endParaRPr lang="es-PE" dirty="0"/>
+            <a:pPr>
+              <a:lnSpc>
+                <a:spcPct val="107000"/>
+              </a:lnSpc>
+              <a:spcAft>
+                <a:spcPts val="800"/>
+              </a:spcAft>
+            </a:pPr>
+            <a:r>
+              <a:rPr lang="es-PE" sz="3200" dirty="0">
+                <a:effectLst/>
+                <a:latin typeface="Impact" panose="020B0806030902050204" pitchFamily="34" charset="0"/>
+                <a:ea typeface="Times New Roman" panose="02020603050405020304" pitchFamily="18" charset="0"/>
+                <a:cs typeface="Arial" panose="020B0604020202020204" pitchFamily="34" charset="0"/>
+              </a:rPr>
+              <a:t>TEAM # 11</a:t>
+            </a:r>
+            <a:endParaRPr lang="es-PE" sz="3200" dirty="0">
+              <a:effectLst/>
+              <a:latin typeface="Calibri" panose="020F0502020204030204" pitchFamily="34" charset="0"/>
+              <a:ea typeface="Calibri" panose="020F0502020204030204" pitchFamily="34" charset="0"/>
+              <a:cs typeface="Times New Roman" panose="02020603050405020304" pitchFamily="18" charset="0"/>
+            </a:endParaRPr>
+          </a:p>
+          <a:p>
+            <a:pPr>
+              <a:lnSpc>
+                <a:spcPct val="107000"/>
+              </a:lnSpc>
+              <a:spcAft>
+                <a:spcPts val="800"/>
+              </a:spcAft>
+            </a:pPr>
+            <a:r>
+              <a:rPr lang="es-PE" sz="1100" dirty="0">
+                <a:effectLst/>
+                <a:latin typeface="Calibri" panose="020F0502020204030204" pitchFamily="34" charset="0"/>
+                <a:ea typeface="Calibri" panose="020F0502020204030204" pitchFamily="34" charset="0"/>
+                <a:cs typeface="Times New Roman" panose="02020603050405020304" pitchFamily="18" charset="0"/>
+              </a:rPr>
+              <a:t> </a:t>
+            </a:r>
           </a:p>
         </p:txBody>
       </p:sp>
       <p:pic>
         <p:nvPicPr>
-          <p:cNvPr id="9" name="Gráfico 8" descr="Serpiente">
+          <p:cNvPr id="15" name="Imagen 14">
             <a:extLst>
               <a:ext uri="{FF2B5EF4-FFF2-40B4-BE49-F238E27FC236}">
-                <a16:creationId xmlns:a16="http://schemas.microsoft.com/office/drawing/2014/main" id="{1C5AA78F-9F71-40F7-B349-A0B726E1B50B}"/>
+                <a16:creationId xmlns:a16="http://schemas.microsoft.com/office/drawing/2014/main" id="{A4090606-D71D-40B9-8648-5BE58D23F366}"/>
               </a:ext>
             </a:extLst>
           </p:cNvPr>
@@ -8113,10 +6541,80 @@
           <p:nvPr/>
         </p:nvPicPr>
         <p:blipFill>
-          <a:blip r:embed="rId2">
+          <a:blip r:embed="rId2"/>
+          <a:stretch>
+            <a:fillRect/>
+          </a:stretch>
+        </p:blipFill>
+        <p:spPr>
+          <a:xfrm>
+            <a:off x="10127768" y="5414590"/>
+            <a:ext cx="1667673" cy="1667673"/>
+          </a:xfrm>
+          <a:prstGeom prst="rect">
+            <a:avLst/>
+          </a:prstGeom>
+          <a:ln>
+            <a:noFill/>
+          </a:ln>
+          <a:effectLst>
+            <a:outerShdw blurRad="292100" dist="139700" dir="2700000" algn="tl" rotWithShape="0">
+              <a:srgbClr val="333333">
+                <a:alpha val="65000"/>
+              </a:srgbClr>
+            </a:outerShdw>
+          </a:effectLst>
+        </p:spPr>
+      </p:pic>
+      <p:pic>
+        <p:nvPicPr>
+          <p:cNvPr id="17" name="Imagen 16">
+            <a:extLst>
+              <a:ext uri="{FF2B5EF4-FFF2-40B4-BE49-F238E27FC236}">
+                <a16:creationId xmlns:a16="http://schemas.microsoft.com/office/drawing/2014/main" id="{47FD4C73-7E2D-413E-B795-B961CD7B932C}"/>
+              </a:ext>
+            </a:extLst>
+          </p:cNvPr>
+          <p:cNvPicPr>
+            <a:picLocks noChangeAspect="1"/>
+          </p:cNvPicPr>
+          <p:nvPr/>
+        </p:nvPicPr>
+        <p:blipFill>
+          <a:blip r:embed="rId3"/>
+          <a:stretch>
+            <a:fillRect/>
+          </a:stretch>
+        </p:blipFill>
+        <p:spPr>
+          <a:xfrm>
+            <a:off x="2412160" y="1477860"/>
+            <a:ext cx="7367680" cy="3330191"/>
+          </a:xfrm>
+          <a:prstGeom prst="rect">
+            <a:avLst/>
+          </a:prstGeom>
+        </p:spPr>
+      </p:pic>
+      <p:pic>
+        <p:nvPicPr>
+          <p:cNvPr id="19" name="Gráfico 18" descr="Serpiente">
+            <a:extLst>
+              <a:ext uri="{FF2B5EF4-FFF2-40B4-BE49-F238E27FC236}">
+                <a16:creationId xmlns:a16="http://schemas.microsoft.com/office/drawing/2014/main" id="{87CE4C4A-B3B8-4C92-BA90-DC2DB0F2AB6A}"/>
+              </a:ext>
+            </a:extLst>
+          </p:cNvPr>
+          <p:cNvPicPr>
+            <a:picLocks noChangeAspect="1"/>
+          </p:cNvPicPr>
+          <p:nvPr/>
+        </p:nvPicPr>
+        <p:blipFill>
+          <a:blip r:embed="rId4">
             <a:extLst>
               <a:ext uri="{96DAC541-7B7A-43D3-8B79-37D633B846F1}">
-                <asvg:svgBlip xmlns:asvg="http://schemas.microsoft.com/office/drawing/2016/SVG/main" r:embed="rId3"/>
+                <asvg:svgBlip xmlns:asvg="http://schemas.microsoft.com/office/drawing/2016/SVG/main" r:embed="rId5"/>
               </a:ext>
             </a:extLst>
           </a:blip>
@@ -8136,10 +6634,10 @@
       </p:pic>
       <p:pic>
         <p:nvPicPr>
-          <p:cNvPr id="10" name="Gráfico 9" descr="Serpiente">
+          <p:cNvPr id="20" name="Gráfico 19" descr="Serpiente">
             <a:extLst>
               <a:ext uri="{FF2B5EF4-FFF2-40B4-BE49-F238E27FC236}">
-                <a16:creationId xmlns:a16="http://schemas.microsoft.com/office/drawing/2014/main" id="{E4EE6FEB-F724-4836-8525-834D7877D49C}"/>
+                <a16:creationId xmlns:a16="http://schemas.microsoft.com/office/drawing/2014/main" id="{03F3CEFD-A67E-4B78-A862-31AA3C44C59B}"/>
               </a:ext>
             </a:extLst>
           </p:cNvPr>
@@ -8149,10 +6647,10 @@
           <p:nvPr/>
         </p:nvPicPr>
         <p:blipFill>
-          <a:blip r:embed="rId2">
+          <a:blip r:embed="rId4">
             <a:extLst>
               <a:ext uri="{96DAC541-7B7A-43D3-8B79-37D633B846F1}">
-                <asvg:svgBlip xmlns:asvg="http://schemas.microsoft.com/office/drawing/2016/SVG/main" r:embed="rId3"/>
+                <asvg:svgBlip xmlns:asvg="http://schemas.microsoft.com/office/drawing/2016/SVG/main" r:embed="rId5"/>
               </a:ext>
             </a:extLst>
           </a:blip>
@@ -8172,10 +6670,10 @@
       </p:pic>
       <p:pic>
         <p:nvPicPr>
-          <p:cNvPr id="12" name="Imagen 11">
+          <p:cNvPr id="21" name="Gráfico 20" descr="Serpiente">
             <a:extLst>
               <a:ext uri="{FF2B5EF4-FFF2-40B4-BE49-F238E27FC236}">
-                <a16:creationId xmlns:a16="http://schemas.microsoft.com/office/drawing/2014/main" id="{C14F3CE2-F452-451F-9E6B-8A5844A9C4E4}"/>
+                <a16:creationId xmlns:a16="http://schemas.microsoft.com/office/drawing/2014/main" id="{47C112A7-A3FB-4E18-A8C0-FF81E4DCE503}"/>
               </a:ext>
             </a:extLst>
           </p:cNvPr>
@@ -8185,50 +6683,10 @@
           <p:nvPr/>
         </p:nvPicPr>
         <p:blipFill>
-          <a:blip r:embed="rId4"/>
-          <a:stretch>
-            <a:fillRect/>
-          </a:stretch>
-        </p:blipFill>
-        <p:spPr>
-          <a:xfrm>
-            <a:off x="10628300" y="5622706"/>
-            <a:ext cx="1252216" cy="1252216"/>
-          </a:xfrm>
-          <a:prstGeom prst="rect">
-            <a:avLst/>
-          </a:prstGeom>
-          <a:ln>
-            <a:noFill/>
-          </a:ln>
-          <a:effectLst>
-            <a:outerShdw blurRad="292100" dist="139700" dir="2700000" algn="tl" rotWithShape="0">
-              <a:srgbClr val="333333">
-                <a:alpha val="65000"/>
-              </a:srgbClr>
-            </a:outerShdw>
-          </a:effectLst>
-        </p:spPr>
-      </p:pic>
-      <p:pic>
-        <p:nvPicPr>
-          <p:cNvPr id="13" name="Gráfico 12" descr="Serpiente">
-            <a:extLst>
-              <a:ext uri="{FF2B5EF4-FFF2-40B4-BE49-F238E27FC236}">
-                <a16:creationId xmlns:a16="http://schemas.microsoft.com/office/drawing/2014/main" id="{BED2E799-80EA-46A0-9CC6-73C0228931C3}"/>
-              </a:ext>
-            </a:extLst>
-          </p:cNvPr>
-          <p:cNvPicPr>
-            <a:picLocks noChangeAspect="1"/>
-          </p:cNvPicPr>
-          <p:nvPr/>
-        </p:nvPicPr>
-        <p:blipFill>
-          <a:blip r:embed="rId2">
+          <a:blip r:embed="rId4">
             <a:extLst>
               <a:ext uri="{96DAC541-7B7A-43D3-8B79-37D633B846F1}">
-                <asvg:svgBlip xmlns:asvg="http://schemas.microsoft.com/office/drawing/2016/SVG/main" r:embed="rId3"/>
+                <asvg:svgBlip xmlns:asvg="http://schemas.microsoft.com/office/drawing/2016/SVG/main" r:embed="rId5"/>
               </a:ext>
             </a:extLst>
           </a:blip>
@@ -8246,174 +6704,10 @@
           </a:prstGeom>
         </p:spPr>
       </p:pic>
-      <p:sp>
-        <p:nvSpPr>
-          <p:cNvPr id="14" name="Cuadro de texto 2">
-            <a:extLst>
-              <a:ext uri="{FF2B5EF4-FFF2-40B4-BE49-F238E27FC236}">
-                <a16:creationId xmlns:a16="http://schemas.microsoft.com/office/drawing/2014/main" id="{BE6BFC69-E8F9-4526-9143-E058F4A2DAC6}"/>
-              </a:ext>
-            </a:extLst>
-          </p:cNvPr>
-          <p:cNvSpPr txBox="1">
-            <a:spLocks noChangeArrowheads="1"/>
-          </p:cNvSpPr>
-          <p:nvPr/>
-        </p:nvSpPr>
-        <p:spPr bwMode="auto">
-          <a:xfrm>
-            <a:off x="5068173" y="5905914"/>
-            <a:ext cx="2324100" cy="342900"/>
-          </a:xfrm>
-          <a:prstGeom prst="rect">
-            <a:avLst/>
-          </a:prstGeom>
-          <a:noFill/>
-          <a:ln w="9525">
-            <a:noFill/>
-            <a:miter lim="800000"/>
-            <a:headEnd/>
-            <a:tailEnd/>
-          </a:ln>
-        </p:spPr>
-        <p:txBody>
-          <a:bodyPr rot="0" vert="horz" wrap="square" lIns="91440" tIns="45720" rIns="91440" bIns="45720" anchor="t" anchorCtr="0">
-            <a:noAutofit/>
-          </a:bodyPr>
-          <a:lstStyle/>
-          <a:p>
-            <a:pPr>
-              <a:lnSpc>
-                <a:spcPct val="107000"/>
-              </a:lnSpc>
-              <a:spcAft>
-                <a:spcPts val="800"/>
-              </a:spcAft>
-            </a:pPr>
-            <a:r>
-              <a:rPr lang="es-PE" sz="2000" dirty="0">
-                <a:solidFill>
-                  <a:schemeClr val="tx1">
-                    <a:lumMod val="85000"/>
-                  </a:schemeClr>
-                </a:solidFill>
-                <a:effectLst/>
-                <a:latin typeface="Impact" panose="020B0806030902050204" pitchFamily="34" charset="0"/>
-                <a:ea typeface="Times New Roman" panose="02020603050405020304" pitchFamily="18" charset="0"/>
-                <a:cs typeface="Arial" panose="020B0604020202020204" pitchFamily="34" charset="0"/>
-              </a:rPr>
-              <a:t>  &gt;&gt;  </a:t>
-            </a:r>
-            <a:r>
-              <a:rPr lang="es-PE" sz="2000" b="1" dirty="0">
-                <a:solidFill>
-                  <a:schemeClr val="tx1">
-                    <a:lumMod val="85000"/>
-                  </a:schemeClr>
-                </a:solidFill>
-                <a:effectLst/>
-                <a:latin typeface="Calibri Light" panose="020F0302020204030204" pitchFamily="34" charset="0"/>
-                <a:ea typeface="Times New Roman" panose="02020603050405020304" pitchFamily="18" charset="0"/>
-                <a:cs typeface="Times New Roman" panose="02020603050405020304" pitchFamily="18" charset="0"/>
-              </a:rPr>
-              <a:t>RETO ENERO  &lt;&lt;</a:t>
-            </a:r>
-            <a:endParaRPr lang="es-PE" sz="2000" dirty="0">
-              <a:solidFill>
-                <a:schemeClr val="tx1">
-                  <a:lumMod val="85000"/>
-                </a:schemeClr>
-              </a:solidFill>
-              <a:effectLst/>
-              <a:latin typeface="Calibri" panose="020F0502020204030204" pitchFamily="34" charset="0"/>
-              <a:ea typeface="Calibri" panose="020F0502020204030204" pitchFamily="34" charset="0"/>
-              <a:cs typeface="Times New Roman" panose="02020603050405020304" pitchFamily="18" charset="0"/>
-            </a:endParaRPr>
-          </a:p>
-        </p:txBody>
-      </p:sp>
-      <p:pic>
-        <p:nvPicPr>
-          <p:cNvPr id="4" name="Imagen 3">
-            <a:extLst>
-              <a:ext uri="{FF2B5EF4-FFF2-40B4-BE49-F238E27FC236}">
-                <a16:creationId xmlns:a16="http://schemas.microsoft.com/office/drawing/2014/main" id="{A29F9A05-9B8A-482F-AA48-C2CAB82FAEE4}"/>
-              </a:ext>
-            </a:extLst>
-          </p:cNvPr>
-          <p:cNvPicPr>
-            <a:picLocks noChangeAspect="1"/>
-          </p:cNvPicPr>
-          <p:nvPr/>
-        </p:nvPicPr>
-        <p:blipFill rotWithShape="1">
-          <a:blip r:embed="rId5">
-            <a:duotone>
-              <a:schemeClr val="bg2">
-                <a:shade val="45000"/>
-                <a:satMod val="135000"/>
-              </a:schemeClr>
-              <a:prstClr val="white"/>
-            </a:duotone>
-            <a:extLst>
-              <a:ext uri="{BEBA8EAE-BF5A-486C-A8C5-ECC9F3942E4B}">
-                <a14:imgProps xmlns:a14="http://schemas.microsoft.com/office/drawing/2010/main">
-                  <a14:imgLayer r:embed="rId6">
-                    <a14:imgEffect>
-                      <a14:saturation sat="0"/>
-                    </a14:imgEffect>
-                  </a14:imgLayer>
-                </a14:imgProps>
-              </a:ext>
-            </a:extLst>
-          </a:blip>
-          <a:srcRect l="-92" t="30471" r="92" b="9293"/>
-          <a:stretch/>
-        </p:blipFill>
-        <p:spPr>
-          <a:xfrm>
-            <a:off x="1240435" y="609186"/>
-            <a:ext cx="9144000" cy="3311555"/>
-          </a:xfrm>
-          <a:prstGeom prst="rect">
-            <a:avLst/>
-          </a:prstGeom>
-        </p:spPr>
-      </p:pic>
-      <p:pic>
-        <p:nvPicPr>
-          <p:cNvPr id="11" name="Imagen 10">
-            <a:extLst>
-              <a:ext uri="{FF2B5EF4-FFF2-40B4-BE49-F238E27FC236}">
-                <a16:creationId xmlns:a16="http://schemas.microsoft.com/office/drawing/2014/main" id="{7F25073F-A223-4B66-8108-BDA92E1F4BAE}"/>
-              </a:ext>
-            </a:extLst>
-          </p:cNvPr>
-          <p:cNvPicPr>
-            <a:picLocks noChangeAspect="1"/>
-          </p:cNvPicPr>
-          <p:nvPr/>
-        </p:nvPicPr>
-        <p:blipFill>
-          <a:blip r:embed="rId7"/>
-          <a:stretch>
-            <a:fillRect/>
-          </a:stretch>
-        </p:blipFill>
-        <p:spPr>
-          <a:xfrm>
-            <a:off x="8074132" y="609185"/>
-            <a:ext cx="3124108" cy="3311555"/>
-          </a:xfrm>
-          <a:prstGeom prst="rect">
-            <a:avLst/>
-          </a:prstGeom>
-        </p:spPr>
-      </p:pic>
     </p:spTree>
     <p:extLst>
       <p:ext uri="{BB962C8B-B14F-4D97-AF65-F5344CB8AC3E}">
-        <p14:creationId xmlns:p14="http://schemas.microsoft.com/office/powerpoint/2010/main" val="3547071279"/>
+        <p14:creationId xmlns:p14="http://schemas.microsoft.com/office/powerpoint/2010/main" val="4145679494"/>
       </p:ext>
     </p:extLst>
   </p:cSld>
@@ -8423,423 +6717,7 @@
 </p:sld>
 </file>
 
-<file path=ppt/slides/slide3.xml><?xml version="1.0" encoding="utf-8"?>
-<p:sld xmlns:a="http://schemas.openxmlformats.org/drawingml/2006/main" xmlns:r="http://schemas.openxmlformats.org/officeDocument/2006/relationships" xmlns:p="http://schemas.openxmlformats.org/presentationml/2006/main">
-  <p:cSld>
-    <p:spTree>
-      <p:nvGrpSpPr>
-        <p:cNvPr id="1" name=""/>
-        <p:cNvGrpSpPr/>
-        <p:nvPr/>
-      </p:nvGrpSpPr>
-      <p:grpSpPr>
-        <a:xfrm>
-          <a:off x="0" y="0"/>
-          <a:ext cx="0" cy="0"/>
-          <a:chOff x="0" y="0"/>
-          <a:chExt cx="0" cy="0"/>
-        </a:xfrm>
-      </p:grpSpPr>
-      <p:sp>
-        <p:nvSpPr>
-          <p:cNvPr id="2" name="Título 1">
-            <a:extLst>
-              <a:ext uri="{FF2B5EF4-FFF2-40B4-BE49-F238E27FC236}">
-                <a16:creationId xmlns:a16="http://schemas.microsoft.com/office/drawing/2014/main" id="{16877AE7-6248-407C-A719-C19911673446}"/>
-              </a:ext>
-            </a:extLst>
-          </p:cNvPr>
-          <p:cNvSpPr>
-            <a:spLocks noGrp="1"/>
-          </p:cNvSpPr>
-          <p:nvPr>
-            <p:ph type="title"/>
-          </p:nvPr>
-        </p:nvSpPr>
-        <p:spPr>
-          <a:xfrm>
-            <a:off x="1807565" y="4383849"/>
-            <a:ext cx="8576870" cy="1238857"/>
-          </a:xfrm>
-        </p:spPr>
-        <p:txBody>
-          <a:bodyPr>
-            <a:normAutofit fontScale="90000"/>
-          </a:bodyPr>
-          <a:lstStyle/>
-          <a:p>
-            <a:pPr algn="ctr"/>
-            <a:r>
-              <a:rPr lang="es-PE" sz="4000" dirty="0"/>
-              <a:t>CHALLENGE</a:t>
-            </a:r>
-            <a:br>
-              <a:rPr lang="es-ES" sz="4000" dirty="0"/>
-            </a:br>
-            <a:r>
-              <a:rPr lang="es-PE" sz="4000" dirty="0"/>
-              <a:t>“The Minion Game”</a:t>
-            </a:r>
-            <a:br>
-              <a:rPr lang="es-PE" dirty="0"/>
-            </a:br>
-            <a:endParaRPr lang="es-PE" dirty="0"/>
-          </a:p>
-        </p:txBody>
-      </p:sp>
-      <p:pic>
-        <p:nvPicPr>
-          <p:cNvPr id="9" name="Gráfico 8" descr="Serpiente">
-            <a:extLst>
-              <a:ext uri="{FF2B5EF4-FFF2-40B4-BE49-F238E27FC236}">
-                <a16:creationId xmlns:a16="http://schemas.microsoft.com/office/drawing/2014/main" id="{1C5AA78F-9F71-40F7-B349-A0B726E1B50B}"/>
-              </a:ext>
-            </a:extLst>
-          </p:cNvPr>
-          <p:cNvPicPr>
-            <a:picLocks noChangeAspect="1"/>
-          </p:cNvPicPr>
-          <p:nvPr/>
-        </p:nvPicPr>
-        <p:blipFill>
-          <a:blip r:embed="rId2">
-            <a:extLst>
-              <a:ext uri="{96DAC541-7B7A-43D3-8B79-37D633B846F1}">
-                <asvg:svgBlip xmlns:asvg="http://schemas.microsoft.com/office/drawing/2016/SVG/main" r:embed="rId3"/>
-              </a:ext>
-            </a:extLst>
-          </a:blip>
-          <a:stretch>
-            <a:fillRect/>
-          </a:stretch>
-        </p:blipFill>
-        <p:spPr>
-          <a:xfrm rot="20260249">
-            <a:off x="11456116" y="603016"/>
-            <a:ext cx="590721" cy="590721"/>
-          </a:xfrm>
-          <a:prstGeom prst="rect">
-            <a:avLst/>
-          </a:prstGeom>
-        </p:spPr>
-      </p:pic>
-      <p:pic>
-        <p:nvPicPr>
-          <p:cNvPr id="10" name="Gráfico 9" descr="Serpiente">
-            <a:extLst>
-              <a:ext uri="{FF2B5EF4-FFF2-40B4-BE49-F238E27FC236}">
-                <a16:creationId xmlns:a16="http://schemas.microsoft.com/office/drawing/2014/main" id="{E4EE6FEB-F724-4836-8525-834D7877D49C}"/>
-              </a:ext>
-            </a:extLst>
-          </p:cNvPr>
-          <p:cNvPicPr>
-            <a:picLocks noChangeAspect="1"/>
-          </p:cNvPicPr>
-          <p:nvPr/>
-        </p:nvPicPr>
-        <p:blipFill>
-          <a:blip r:embed="rId2">
-            <a:extLst>
-              <a:ext uri="{96DAC541-7B7A-43D3-8B79-37D633B846F1}">
-                <asvg:svgBlip xmlns:asvg="http://schemas.microsoft.com/office/drawing/2016/SVG/main" r:embed="rId3"/>
-              </a:ext>
-            </a:extLst>
-          </a:blip>
-          <a:stretch>
-            <a:fillRect/>
-          </a:stretch>
-        </p:blipFill>
-        <p:spPr>
-          <a:xfrm rot="20656247">
-            <a:off x="11436620" y="2442669"/>
-            <a:ext cx="627035" cy="627035"/>
-          </a:xfrm>
-          <a:prstGeom prst="rect">
-            <a:avLst/>
-          </a:prstGeom>
-        </p:spPr>
-      </p:pic>
-      <p:pic>
-        <p:nvPicPr>
-          <p:cNvPr id="12" name="Imagen 11">
-            <a:extLst>
-              <a:ext uri="{FF2B5EF4-FFF2-40B4-BE49-F238E27FC236}">
-                <a16:creationId xmlns:a16="http://schemas.microsoft.com/office/drawing/2014/main" id="{C14F3CE2-F452-451F-9E6B-8A5844A9C4E4}"/>
-              </a:ext>
-            </a:extLst>
-          </p:cNvPr>
-          <p:cNvPicPr>
-            <a:picLocks noChangeAspect="1"/>
-          </p:cNvPicPr>
-          <p:nvPr/>
-        </p:nvPicPr>
-        <p:blipFill>
-          <a:blip r:embed="rId4"/>
-          <a:stretch>
-            <a:fillRect/>
-          </a:stretch>
-        </p:blipFill>
-        <p:spPr>
-          <a:xfrm>
-            <a:off x="10628300" y="5622706"/>
-            <a:ext cx="1252216" cy="1252216"/>
-          </a:xfrm>
-          <a:prstGeom prst="rect">
-            <a:avLst/>
-          </a:prstGeom>
-          <a:ln>
-            <a:noFill/>
-          </a:ln>
-          <a:effectLst>
-            <a:outerShdw blurRad="292100" dist="139700" dir="2700000" algn="tl" rotWithShape="0">
-              <a:srgbClr val="333333">
-                <a:alpha val="65000"/>
-              </a:srgbClr>
-            </a:outerShdw>
-          </a:effectLst>
-        </p:spPr>
-      </p:pic>
-      <p:pic>
-        <p:nvPicPr>
-          <p:cNvPr id="13" name="Gráfico 12" descr="Serpiente">
-            <a:extLst>
-              <a:ext uri="{FF2B5EF4-FFF2-40B4-BE49-F238E27FC236}">
-                <a16:creationId xmlns:a16="http://schemas.microsoft.com/office/drawing/2014/main" id="{BED2E799-80EA-46A0-9CC6-73C0228931C3}"/>
-              </a:ext>
-            </a:extLst>
-          </p:cNvPr>
-          <p:cNvPicPr>
-            <a:picLocks noChangeAspect="1"/>
-          </p:cNvPicPr>
-          <p:nvPr/>
-        </p:nvPicPr>
-        <p:blipFill>
-          <a:blip r:embed="rId2">
-            <a:extLst>
-              <a:ext uri="{96DAC541-7B7A-43D3-8B79-37D633B846F1}">
-                <asvg:svgBlip xmlns:asvg="http://schemas.microsoft.com/office/drawing/2016/SVG/main" r:embed="rId3"/>
-              </a:ext>
-            </a:extLst>
-          </a:blip>
-          <a:stretch>
-            <a:fillRect/>
-          </a:stretch>
-        </p:blipFill>
-        <p:spPr>
-          <a:xfrm rot="20656247">
-            <a:off x="11436619" y="4301819"/>
-            <a:ext cx="627035" cy="627035"/>
-          </a:xfrm>
-          <a:prstGeom prst="rect">
-            <a:avLst/>
-          </a:prstGeom>
-        </p:spPr>
-      </p:pic>
-      <p:sp>
-        <p:nvSpPr>
-          <p:cNvPr id="14" name="Cuadro de texto 2">
-            <a:extLst>
-              <a:ext uri="{FF2B5EF4-FFF2-40B4-BE49-F238E27FC236}">
-                <a16:creationId xmlns:a16="http://schemas.microsoft.com/office/drawing/2014/main" id="{BE6BFC69-E8F9-4526-9143-E058F4A2DAC6}"/>
-              </a:ext>
-            </a:extLst>
-          </p:cNvPr>
-          <p:cNvSpPr txBox="1">
-            <a:spLocks noChangeArrowheads="1"/>
-          </p:cNvSpPr>
-          <p:nvPr/>
-        </p:nvSpPr>
-        <p:spPr bwMode="auto">
-          <a:xfrm>
-            <a:off x="4933950" y="6163512"/>
-            <a:ext cx="2324100" cy="342900"/>
-          </a:xfrm>
-          <a:prstGeom prst="rect">
-            <a:avLst/>
-          </a:prstGeom>
-          <a:noFill/>
-          <a:ln w="9525">
-            <a:noFill/>
-            <a:miter lim="800000"/>
-            <a:headEnd/>
-            <a:tailEnd/>
-          </a:ln>
-        </p:spPr>
-        <p:txBody>
-          <a:bodyPr rot="0" vert="horz" wrap="square" lIns="91440" tIns="45720" rIns="91440" bIns="45720" anchor="t" anchorCtr="0">
-            <a:noAutofit/>
-          </a:bodyPr>
-          <a:lstStyle/>
-          <a:p>
-            <a:pPr>
-              <a:lnSpc>
-                <a:spcPct val="107000"/>
-              </a:lnSpc>
-              <a:spcAft>
-                <a:spcPts val="800"/>
-              </a:spcAft>
-            </a:pPr>
-            <a:r>
-              <a:rPr lang="es-PE" sz="2000" dirty="0">
-                <a:solidFill>
-                  <a:schemeClr val="tx1">
-                    <a:lumMod val="85000"/>
-                  </a:schemeClr>
-                </a:solidFill>
-                <a:effectLst/>
-                <a:latin typeface="Impact" panose="020B0806030902050204" pitchFamily="34" charset="0"/>
-                <a:ea typeface="Times New Roman" panose="02020603050405020304" pitchFamily="18" charset="0"/>
-                <a:cs typeface="Arial" panose="020B0604020202020204" pitchFamily="34" charset="0"/>
-              </a:rPr>
-              <a:t>  </a:t>
-            </a:r>
-            <a:r>
-              <a:rPr lang="es-PE" sz="2000" b="1" dirty="0">
-                <a:solidFill>
-                  <a:schemeClr val="tx1">
-                    <a:lumMod val="85000"/>
-                  </a:schemeClr>
-                </a:solidFill>
-                <a:effectLst/>
-                <a:latin typeface="Impact" panose="020B0806030902050204" pitchFamily="34" charset="0"/>
-                <a:ea typeface="Times New Roman" panose="02020603050405020304" pitchFamily="18" charset="0"/>
-                <a:cs typeface="Arial" panose="020B0604020202020204" pitchFamily="34" charset="0"/>
-              </a:rPr>
-              <a:t>&gt;&gt;  </a:t>
-            </a:r>
-            <a:r>
-              <a:rPr lang="es-PE" sz="2000" b="1" dirty="0">
-                <a:solidFill>
-                  <a:schemeClr val="tx1">
-                    <a:lumMod val="85000"/>
-                  </a:schemeClr>
-                </a:solidFill>
-                <a:effectLst/>
-                <a:latin typeface="Calibri Light" panose="020F0302020204030204" pitchFamily="34" charset="0"/>
-                <a:ea typeface="Times New Roman" panose="02020603050405020304" pitchFamily="18" charset="0"/>
-                <a:cs typeface="Times New Roman" panose="02020603050405020304" pitchFamily="18" charset="0"/>
-              </a:rPr>
-              <a:t>RETO ENERO  &lt;&lt;</a:t>
-            </a:r>
-            <a:endParaRPr lang="es-PE" sz="2000" b="1" dirty="0">
-              <a:solidFill>
-                <a:schemeClr val="tx1">
-                  <a:lumMod val="85000"/>
-                </a:schemeClr>
-              </a:solidFill>
-              <a:effectLst/>
-              <a:latin typeface="Calibri" panose="020F0502020204030204" pitchFamily="34" charset="0"/>
-              <a:ea typeface="Calibri" panose="020F0502020204030204" pitchFamily="34" charset="0"/>
-              <a:cs typeface="Times New Roman" panose="02020603050405020304" pitchFamily="18" charset="0"/>
-            </a:endParaRPr>
-          </a:p>
-        </p:txBody>
-      </p:sp>
-      <p:grpSp>
-        <p:nvGrpSpPr>
-          <p:cNvPr id="18" name="Grupo 17">
-            <a:extLst>
-              <a:ext uri="{FF2B5EF4-FFF2-40B4-BE49-F238E27FC236}">
-                <a16:creationId xmlns:a16="http://schemas.microsoft.com/office/drawing/2014/main" id="{5AF440B2-E7C4-4500-9E1C-EC20C10C2D61}"/>
-              </a:ext>
-            </a:extLst>
-          </p:cNvPr>
-          <p:cNvGrpSpPr/>
-          <p:nvPr/>
-        </p:nvGrpSpPr>
-        <p:grpSpPr>
-          <a:xfrm>
-            <a:off x="1557319" y="808935"/>
-            <a:ext cx="9077361" cy="2869683"/>
-            <a:chOff x="2197444" y="972474"/>
-            <a:chExt cx="8356041" cy="2692699"/>
-          </a:xfrm>
-        </p:grpSpPr>
-        <p:pic>
-          <p:nvPicPr>
-            <p:cNvPr id="16" name="Imagen 15">
-              <a:extLst>
-                <a:ext uri="{FF2B5EF4-FFF2-40B4-BE49-F238E27FC236}">
-                  <a16:creationId xmlns:a16="http://schemas.microsoft.com/office/drawing/2014/main" id="{EE4CD664-A855-414F-97E1-D4693F657000}"/>
-                </a:ext>
-              </a:extLst>
-            </p:cNvPr>
-            <p:cNvPicPr>
-              <a:picLocks noChangeAspect="1"/>
-            </p:cNvPicPr>
-            <p:nvPr/>
-          </p:nvPicPr>
-          <p:blipFill>
-            <a:blip r:embed="rId5">
-              <a:grayscl/>
-            </a:blip>
-            <a:stretch>
-              <a:fillRect/>
-            </a:stretch>
-          </p:blipFill>
-          <p:spPr>
-            <a:xfrm>
-              <a:off x="2197444" y="972474"/>
-              <a:ext cx="5741458" cy="2692699"/>
-            </a:xfrm>
-            <a:prstGeom prst="rect">
-              <a:avLst/>
-            </a:prstGeom>
-          </p:spPr>
-        </p:pic>
-        <p:pic>
-          <p:nvPicPr>
-            <p:cNvPr id="17" name="Imagen 16">
-              <a:extLst>
-                <a:ext uri="{FF2B5EF4-FFF2-40B4-BE49-F238E27FC236}">
-                  <a16:creationId xmlns:a16="http://schemas.microsoft.com/office/drawing/2014/main" id="{FAB71B78-533F-44F4-8EE2-8B2CA0512290}"/>
-                </a:ext>
-              </a:extLst>
-            </p:cNvPr>
-            <p:cNvPicPr>
-              <a:picLocks noChangeAspect="1"/>
-            </p:cNvPicPr>
-            <p:nvPr/>
-          </p:nvPicPr>
-          <p:blipFill>
-            <a:blip r:embed="rId6">
-              <a:duotone>
-                <a:prstClr val="black"/>
-                <a:schemeClr val="accent6">
-                  <a:tint val="45000"/>
-                  <a:satMod val="400000"/>
-                </a:schemeClr>
-              </a:duotone>
-            </a:blip>
-            <a:stretch>
-              <a:fillRect/>
-            </a:stretch>
-          </p:blipFill>
-          <p:spPr>
-            <a:xfrm>
-              <a:off x="8023849" y="972474"/>
-              <a:ext cx="2529636" cy="2681414"/>
-            </a:xfrm>
-            <a:prstGeom prst="rect">
-              <a:avLst/>
-            </a:prstGeom>
-          </p:spPr>
-        </p:pic>
-      </p:grpSp>
-    </p:spTree>
-    <p:extLst>
-      <p:ext uri="{BB962C8B-B14F-4D97-AF65-F5344CB8AC3E}">
-        <p14:creationId xmlns:p14="http://schemas.microsoft.com/office/powerpoint/2010/main" val="660269755"/>
-      </p:ext>
-    </p:extLst>
-  </p:cSld>
-  <p:clrMapOvr>
-    <a:masterClrMapping/>
-  </p:clrMapOvr>
-</p:sld>
-</file>
-
-<file path=ppt/slides/slide4.xml><?xml version="1.0" encoding="utf-8"?>
+<file path=ppt/slides/slide2.xml><?xml version="1.0" encoding="utf-8"?>
 <p:sld xmlns:a="http://schemas.openxmlformats.org/drawingml/2006/main" xmlns:r="http://schemas.openxmlformats.org/officeDocument/2006/relationships" xmlns:p="http://schemas.openxmlformats.org/presentationml/2006/main">
   <p:cSld>
     <p:spTree>
@@ -9678,6 +7556,36 @@
           </a:effectLst>
         </p:spPr>
       </p:pic>
+      <p:pic>
+        <p:nvPicPr>
+          <p:cNvPr id="3" name="Imagen 2">
+            <a:extLst>
+              <a:ext uri="{FF2B5EF4-FFF2-40B4-BE49-F238E27FC236}">
+                <a16:creationId xmlns:a16="http://schemas.microsoft.com/office/drawing/2014/main" id="{8234512E-2928-41A3-B2FA-4B8DD73B069A}"/>
+              </a:ext>
+            </a:extLst>
+          </p:cNvPr>
+          <p:cNvPicPr>
+            <a:picLocks noChangeAspect="1"/>
+          </p:cNvPicPr>
+          <p:nvPr/>
+        </p:nvPicPr>
+        <p:blipFill>
+          <a:blip r:embed="rId5"/>
+          <a:stretch>
+            <a:fillRect/>
+          </a:stretch>
+        </p:blipFill>
+        <p:spPr>
+          <a:xfrm>
+            <a:off x="2234896" y="1607036"/>
+            <a:ext cx="7373634" cy="4436089"/>
+          </a:xfrm>
+          <a:prstGeom prst="rect">
+            <a:avLst/>
+          </a:prstGeom>
+        </p:spPr>
+      </p:pic>
     </p:spTree>
     <p:extLst>
       <p:ext uri="{BB962C8B-B14F-4D97-AF65-F5344CB8AC3E}">
@@ -9691,7 +7599,7 @@
 </p:sld>
 </file>
 
-<file path=ppt/slides/slide5.xml><?xml version="1.0" encoding="utf-8"?>
+<file path=ppt/slides/slide3.xml><?xml version="1.0" encoding="utf-8"?>
 <p:sld xmlns:a="http://schemas.openxmlformats.org/drawingml/2006/main" xmlns:r="http://schemas.openxmlformats.org/officeDocument/2006/relationships" xmlns:p="http://schemas.openxmlformats.org/presentationml/2006/main">
   <p:cSld>
     <p:spTree>
@@ -10718,7 +8626,7 @@
         </p:nvSpPr>
         <p:spPr>
           <a:xfrm>
-            <a:off x="2804728" y="6505624"/>
+            <a:off x="2731888" y="6406360"/>
             <a:ext cx="7488134" cy="276999"/>
           </a:xfrm>
           <a:prstGeom prst="rect">
@@ -10790,7 +8698,7 @@
 </p:sld>
 </file>
 
-<file path=ppt/slides/slide6.xml><?xml version="1.0" encoding="utf-8"?>
+<file path=ppt/slides/slide4.xml><?xml version="1.0" encoding="utf-8"?>
 <p:sld xmlns:a="http://schemas.openxmlformats.org/drawingml/2006/main" xmlns:r="http://schemas.openxmlformats.org/officeDocument/2006/relationships" xmlns:p="http://schemas.openxmlformats.org/presentationml/2006/main">
   <p:cSld>
     <p:spTree>
@@ -11919,7 +9827,7 @@
 </p:sld>
 </file>
 
-<file path=ppt/slides/slide7.xml><?xml version="1.0" encoding="utf-8"?>
+<file path=ppt/slides/slide5.xml><?xml version="1.0" encoding="utf-8"?>
 <p:sld xmlns:a="http://schemas.openxmlformats.org/drawingml/2006/main" xmlns:r="http://schemas.openxmlformats.org/officeDocument/2006/relationships" xmlns:p="http://schemas.openxmlformats.org/presentationml/2006/main">
   <p:cSld>
     <p:spTree>
@@ -13054,7 +10962,7 @@
 </p:sld>
 </file>
 
-<file path=ppt/slides/slide8.xml><?xml version="1.0" encoding="utf-8"?>
+<file path=ppt/slides/slide6.xml><?xml version="1.0" encoding="utf-8"?>
 <p:sld xmlns:a="http://schemas.openxmlformats.org/drawingml/2006/main" xmlns:r="http://schemas.openxmlformats.org/officeDocument/2006/relationships" xmlns:p="http://schemas.openxmlformats.org/presentationml/2006/main">
   <p:cSld>
     <p:spTree>
@@ -13679,8 +11587,8 @@
         </p:nvSpPr>
         <p:spPr>
           <a:xfrm>
-            <a:off x="2566873" y="6211510"/>
-            <a:ext cx="7504767" cy="461665"/>
+            <a:off x="1641964" y="6395744"/>
+            <a:ext cx="9257720" cy="276999"/>
           </a:xfrm>
           <a:prstGeom prst="rect">
             <a:avLst/>
@@ -13703,7 +11611,7 @@
                   </a:schemeClr>
                 </a:solidFill>
               </a:rPr>
-              <a:t>https://github.com/MayumyCH/dsfem_datachallenge_monthly/blob/main/the_minion_game/Resoluci%C3%B3n%20del%20challenge.pdf</a:t>
+              <a:t>https://github.com/MayumyCH/dsfem_datachallenge_monthly/blob/main/the_minion_game/dsfem_resolucion_reto1.pdf</a:t>
             </a:r>
           </a:p>
         </p:txBody>
@@ -13765,36 +11673,6 @@
           </a:p>
         </p:txBody>
       </p:sp>
-      <p:pic>
-        <p:nvPicPr>
-          <p:cNvPr id="9" name="Imagen 8">
-            <a:extLst>
-              <a:ext uri="{FF2B5EF4-FFF2-40B4-BE49-F238E27FC236}">
-                <a16:creationId xmlns:a16="http://schemas.microsoft.com/office/drawing/2014/main" id="{41E01F7B-0F1E-4DF9-A5D7-A3896D9EDB01}"/>
-              </a:ext>
-            </a:extLst>
-          </p:cNvPr>
-          <p:cNvPicPr>
-            <a:picLocks noChangeAspect="1"/>
-          </p:cNvPicPr>
-          <p:nvPr/>
-        </p:nvPicPr>
-        <p:blipFill>
-          <a:blip r:embed="rId4"/>
-          <a:stretch>
-            <a:fillRect/>
-          </a:stretch>
-        </p:blipFill>
-        <p:spPr>
-          <a:xfrm>
-            <a:off x="4690733" y="2797873"/>
-            <a:ext cx="6281065" cy="2982186"/>
-          </a:xfrm>
-          <a:prstGeom prst="rect">
-            <a:avLst/>
-          </a:prstGeom>
-        </p:spPr>
-      </p:pic>
       <p:sp>
         <p:nvSpPr>
           <p:cNvPr id="27" name="CuadroTexto 26">
@@ -14116,7 +11994,7 @@
           <p:nvPr/>
         </p:nvPicPr>
         <p:blipFill>
-          <a:blip r:embed="rId5"/>
+          <a:blip r:embed="rId4"/>
           <a:stretch>
             <a:fillRect/>
           </a:stretch>
@@ -14141,6 +12019,36 @@
           </a:effectLst>
         </p:spPr>
       </p:pic>
+      <p:pic>
+        <p:nvPicPr>
+          <p:cNvPr id="4" name="Imagen 3">
+            <a:extLst>
+              <a:ext uri="{FF2B5EF4-FFF2-40B4-BE49-F238E27FC236}">
+                <a16:creationId xmlns:a16="http://schemas.microsoft.com/office/drawing/2014/main" id="{4EEAC5C6-0F73-488A-A193-E09A0C4291E9}"/>
+              </a:ext>
+            </a:extLst>
+          </p:cNvPr>
+          <p:cNvPicPr>
+            <a:picLocks noChangeAspect="1"/>
+          </p:cNvPicPr>
+          <p:nvPr/>
+        </p:nvPicPr>
+        <p:blipFill>
+          <a:blip r:embed="rId5"/>
+          <a:stretch>
+            <a:fillRect/>
+          </a:stretch>
+        </p:blipFill>
+        <p:spPr>
+          <a:xfrm>
+            <a:off x="4691997" y="2797873"/>
+            <a:ext cx="6467475" cy="3171825"/>
+          </a:xfrm>
+          <a:prstGeom prst="rect">
+            <a:avLst/>
+          </a:prstGeom>
+        </p:spPr>
+      </p:pic>
     </p:spTree>
     <p:extLst>
       <p:ext uri="{BB962C8B-B14F-4D97-AF65-F5344CB8AC3E}">
@@ -14154,7 +12062,7 @@
 </p:sld>
 </file>
 
-<file path=ppt/slides/slide9.xml><?xml version="1.0" encoding="utf-8"?>
+<file path=ppt/slides/slide7.xml><?xml version="1.0" encoding="utf-8"?>
 <p:sld xmlns:a="http://schemas.openxmlformats.org/drawingml/2006/main" xmlns:r="http://schemas.openxmlformats.org/officeDocument/2006/relationships" xmlns:p="http://schemas.openxmlformats.org/presentationml/2006/main">
   <p:cSld>
     <p:spTree>
@@ -14807,49 +12715,6 @@
       </p:grpSp>
       <p:sp>
         <p:nvSpPr>
-          <p:cNvPr id="23" name="CuadroTexto 22">
-            <a:extLst>
-              <a:ext uri="{FF2B5EF4-FFF2-40B4-BE49-F238E27FC236}">
-                <a16:creationId xmlns:a16="http://schemas.microsoft.com/office/drawing/2014/main" id="{758310EE-8FBF-4E7F-A961-85FB3837D3F9}"/>
-              </a:ext>
-            </a:extLst>
-          </p:cNvPr>
-          <p:cNvSpPr txBox="1"/>
-          <p:nvPr/>
-        </p:nvSpPr>
-        <p:spPr>
-          <a:xfrm>
-            <a:off x="2566873" y="6211510"/>
-            <a:ext cx="7504767" cy="461665"/>
-          </a:xfrm>
-          <a:prstGeom prst="rect">
-            <a:avLst/>
-          </a:prstGeom>
-          <a:noFill/>
-        </p:spPr>
-        <p:txBody>
-          <a:bodyPr wrap="square" rtlCol="0">
-            <a:spAutoFit/>
-          </a:bodyPr>
-          <a:lstStyle/>
-          <a:p>
-            <a:pPr algn="ctr"/>
-            <a:r>
-              <a:rPr lang="es-PE" sz="1200" b="1" dirty="0">
-                <a:solidFill>
-                  <a:schemeClr val="accent6">
-                    <a:lumMod val="60000"/>
-                    <a:lumOff val="40000"/>
-                  </a:schemeClr>
-                </a:solidFill>
-              </a:rPr>
-              <a:t>https://github.com/MayumyCH/dsfem_datachallenge_monthly/blob/main/the_minion_game/Resoluci%C3%B3n%20del%20challenge.pdf</a:t>
-            </a:r>
-          </a:p>
-        </p:txBody>
-      </p:sp>
-      <p:sp>
-        <p:nvSpPr>
           <p:cNvPr id="27" name="CuadroTexto 26">
             <a:extLst>
               <a:ext uri="{FF2B5EF4-FFF2-40B4-BE49-F238E27FC236}">
@@ -14985,10 +12850,1643 @@
           </a:prstGeom>
         </p:spPr>
       </p:pic>
+      <p:sp>
+        <p:nvSpPr>
+          <p:cNvPr id="21" name="CuadroTexto 20">
+            <a:extLst>
+              <a:ext uri="{FF2B5EF4-FFF2-40B4-BE49-F238E27FC236}">
+                <a16:creationId xmlns:a16="http://schemas.microsoft.com/office/drawing/2014/main" id="{DDE8180B-8CE1-4208-A856-507B43A92CA0}"/>
+              </a:ext>
+            </a:extLst>
+          </p:cNvPr>
+          <p:cNvSpPr txBox="1"/>
+          <p:nvPr/>
+        </p:nvSpPr>
+        <p:spPr>
+          <a:xfrm>
+            <a:off x="1641964" y="6309550"/>
+            <a:ext cx="9257720" cy="276999"/>
+          </a:xfrm>
+          <a:prstGeom prst="rect">
+            <a:avLst/>
+          </a:prstGeom>
+          <a:noFill/>
+        </p:spPr>
+        <p:txBody>
+          <a:bodyPr wrap="square" rtlCol="0">
+            <a:spAutoFit/>
+          </a:bodyPr>
+          <a:lstStyle/>
+          <a:p>
+            <a:pPr algn="ctr"/>
+            <a:r>
+              <a:rPr lang="es-PE" sz="1200" b="1" dirty="0">
+                <a:solidFill>
+                  <a:schemeClr val="accent6">
+                    <a:lumMod val="60000"/>
+                    <a:lumOff val="40000"/>
+                  </a:schemeClr>
+                </a:solidFill>
+              </a:rPr>
+              <a:t>https://github.com/MayumyCH/dsfem_datachallenge_monthly/blob/main/the_minion_game/dsfem_resolucion_reto1.pdf</a:t>
+            </a:r>
+          </a:p>
+        </p:txBody>
+      </p:sp>
     </p:spTree>
     <p:extLst>
       <p:ext uri="{BB962C8B-B14F-4D97-AF65-F5344CB8AC3E}">
         <p14:creationId xmlns:p14="http://schemas.microsoft.com/office/powerpoint/2010/main" val="3618047830"/>
+      </p:ext>
+    </p:extLst>
+  </p:cSld>
+  <p:clrMapOvr>
+    <a:masterClrMapping/>
+  </p:clrMapOvr>
+</p:sld>
+</file>
+
+<file path=ppt/slides/slide8.xml><?xml version="1.0" encoding="utf-8"?>
+<p:sld xmlns:a="http://schemas.openxmlformats.org/drawingml/2006/main" xmlns:r="http://schemas.openxmlformats.org/officeDocument/2006/relationships" xmlns:p="http://schemas.openxmlformats.org/presentationml/2006/main">
+  <p:cSld>
+    <p:spTree>
+      <p:nvGrpSpPr>
+        <p:cNvPr id="1" name=""/>
+        <p:cNvGrpSpPr/>
+        <p:nvPr/>
+      </p:nvGrpSpPr>
+      <p:grpSpPr>
+        <a:xfrm>
+          <a:off x="0" y="0"/>
+          <a:ext cx="0" cy="0"/>
+          <a:chOff x="0" y="0"/>
+          <a:chExt cx="0" cy="0"/>
+        </a:xfrm>
+      </p:grpSpPr>
+      <p:grpSp>
+        <p:nvGrpSpPr>
+          <p:cNvPr id="13" name="Grupo 12">
+            <a:extLst>
+              <a:ext uri="{FF2B5EF4-FFF2-40B4-BE49-F238E27FC236}">
+                <a16:creationId xmlns:a16="http://schemas.microsoft.com/office/drawing/2014/main" id="{096A5902-9744-4AC3-9700-70E13FAE4EF8}"/>
+              </a:ext>
+            </a:extLst>
+          </p:cNvPr>
+          <p:cNvGrpSpPr/>
+          <p:nvPr/>
+        </p:nvGrpSpPr>
+        <p:grpSpPr>
+          <a:xfrm>
+            <a:off x="1220202" y="389379"/>
+            <a:ext cx="2229972" cy="669574"/>
+            <a:chOff x="1010052" y="253465"/>
+            <a:chExt cx="2229972" cy="669574"/>
+          </a:xfrm>
+        </p:grpSpPr>
+        <p:grpSp>
+          <p:nvGrpSpPr>
+            <p:cNvPr id="14" name="Header Artwork" descr="&quot;&quot;" title="Gráfico del título">
+              <a:extLst>
+                <a:ext uri="{FF2B5EF4-FFF2-40B4-BE49-F238E27FC236}">
+                  <a16:creationId xmlns:a16="http://schemas.microsoft.com/office/drawing/2014/main" id="{B1AC7219-10DD-414B-B171-7DB4620CCDC9}"/>
+                </a:ext>
+              </a:extLst>
+            </p:cNvPr>
+            <p:cNvGrpSpPr/>
+            <p:nvPr/>
+          </p:nvGrpSpPr>
+          <p:grpSpPr bwMode="auto">
+            <a:xfrm>
+              <a:off x="1010052" y="298492"/>
+              <a:ext cx="2229972" cy="517525"/>
+              <a:chOff x="0" y="0"/>
+              <a:chExt cx="154" cy="53"/>
+            </a:xfrm>
+            <a:solidFill>
+              <a:schemeClr val="accent5">
+                <a:lumMod val="40000"/>
+                <a:lumOff val="60000"/>
+              </a:schemeClr>
+            </a:solidFill>
+          </p:grpSpPr>
+          <p:sp>
+            <p:nvSpPr>
+              <p:cNvPr id="16" name="Freeform 5">
+                <a:extLst>
+                  <a:ext uri="{FF2B5EF4-FFF2-40B4-BE49-F238E27FC236}">
+                    <a16:creationId xmlns:a16="http://schemas.microsoft.com/office/drawing/2014/main" id="{5484981B-7E4B-4867-964E-6C6285DFF840}"/>
+                  </a:ext>
+                </a:extLst>
+              </p:cNvPr>
+              <p:cNvSpPr>
+                <a:spLocks/>
+              </p:cNvSpPr>
+              <p:nvPr/>
+            </p:nvSpPr>
+            <p:spPr bwMode="auto">
+              <a:xfrm>
+                <a:off x="0" y="0"/>
+                <a:ext cx="46" cy="53"/>
+              </a:xfrm>
+              <a:custGeom>
+                <a:avLst/>
+                <a:gdLst>
+                  <a:gd name="T0" fmla="*/ 0 w 1022"/>
+                  <a:gd name="T1" fmla="*/ 0 h 1161"/>
+                  <a:gd name="T2" fmla="*/ 1022 w 1022"/>
+                  <a:gd name="T3" fmla="*/ 0 h 1161"/>
+                  <a:gd name="T4" fmla="*/ 570 w 1022"/>
+                  <a:gd name="T5" fmla="*/ 1161 h 1161"/>
+                  <a:gd name="T6" fmla="*/ 0 w 1022"/>
+                  <a:gd name="T7" fmla="*/ 1161 h 1161"/>
+                  <a:gd name="T8" fmla="*/ 0 w 1022"/>
+                  <a:gd name="T9" fmla="*/ 0 h 1161"/>
+                </a:gdLst>
+                <a:ahLst/>
+                <a:cxnLst>
+                  <a:cxn ang="0">
+                    <a:pos x="T0" y="T1"/>
+                  </a:cxn>
+                  <a:cxn ang="0">
+                    <a:pos x="T2" y="T3"/>
+                  </a:cxn>
+                  <a:cxn ang="0">
+                    <a:pos x="T4" y="T5"/>
+                  </a:cxn>
+                  <a:cxn ang="0">
+                    <a:pos x="T6" y="T7"/>
+                  </a:cxn>
+                  <a:cxn ang="0">
+                    <a:pos x="T8" y="T9"/>
+                  </a:cxn>
+                </a:cxnLst>
+                <a:rect l="0" t="0" r="r" b="b"/>
+                <a:pathLst>
+                  <a:path w="1022" h="1161">
+                    <a:moveTo>
+                      <a:pt x="0" y="0"/>
+                    </a:moveTo>
+                    <a:lnTo>
+                      <a:pt x="1022" y="0"/>
+                    </a:lnTo>
+                    <a:lnTo>
+                      <a:pt x="570" y="1161"/>
+                    </a:lnTo>
+                    <a:lnTo>
+                      <a:pt x="0" y="1161"/>
+                    </a:lnTo>
+                    <a:lnTo>
+                      <a:pt x="0" y="0"/>
+                    </a:lnTo>
+                    <a:close/>
+                  </a:path>
+                </a:pathLst>
+              </a:custGeom>
+              <a:ln>
+                <a:headEnd/>
+                <a:tailEnd/>
+              </a:ln>
+            </p:spPr>
+            <p:style>
+              <a:lnRef idx="2">
+                <a:schemeClr val="accent6">
+                  <a:shade val="50000"/>
+                </a:schemeClr>
+              </a:lnRef>
+              <a:fillRef idx="1">
+                <a:schemeClr val="accent6"/>
+              </a:fillRef>
+              <a:effectRef idx="0">
+                <a:schemeClr val="accent6"/>
+              </a:effectRef>
+              <a:fontRef idx="minor">
+                <a:schemeClr val="lt1"/>
+              </a:fontRef>
+            </p:style>
+            <p:txBody>
+              <a:bodyPr/>
+              <a:lstStyle/>
+              <a:p>
+                <a:endParaRPr lang="es-PE"/>
+              </a:p>
+            </p:txBody>
+          </p:sp>
+          <p:sp>
+            <p:nvSpPr>
+              <p:cNvPr id="17" name="Freeform 6">
+                <a:extLst>
+                  <a:ext uri="{FF2B5EF4-FFF2-40B4-BE49-F238E27FC236}">
+                    <a16:creationId xmlns:a16="http://schemas.microsoft.com/office/drawing/2014/main" id="{DC6D10AF-9C43-4D48-8E39-9559EF9A3C67}"/>
+                  </a:ext>
+                </a:extLst>
+              </p:cNvPr>
+              <p:cNvSpPr>
+                <a:spLocks/>
+              </p:cNvSpPr>
+              <p:nvPr/>
+            </p:nvSpPr>
+            <p:spPr bwMode="auto">
+              <a:xfrm>
+                <a:off x="39" y="0"/>
+                <a:ext cx="34" cy="53"/>
+              </a:xfrm>
+              <a:custGeom>
+                <a:avLst/>
+                <a:gdLst>
+                  <a:gd name="T0" fmla="*/ 452 w 748"/>
+                  <a:gd name="T1" fmla="*/ 0 h 1161"/>
+                  <a:gd name="T2" fmla="*/ 748 w 748"/>
+                  <a:gd name="T3" fmla="*/ 0 h 1161"/>
+                  <a:gd name="T4" fmla="*/ 296 w 748"/>
+                  <a:gd name="T5" fmla="*/ 1161 h 1161"/>
+                  <a:gd name="T6" fmla="*/ 0 w 748"/>
+                  <a:gd name="T7" fmla="*/ 1161 h 1161"/>
+                  <a:gd name="T8" fmla="*/ 452 w 748"/>
+                  <a:gd name="T9" fmla="*/ 0 h 1161"/>
+                </a:gdLst>
+                <a:ahLst/>
+                <a:cxnLst>
+                  <a:cxn ang="0">
+                    <a:pos x="T0" y="T1"/>
+                  </a:cxn>
+                  <a:cxn ang="0">
+                    <a:pos x="T2" y="T3"/>
+                  </a:cxn>
+                  <a:cxn ang="0">
+                    <a:pos x="T4" y="T5"/>
+                  </a:cxn>
+                  <a:cxn ang="0">
+                    <a:pos x="T6" y="T7"/>
+                  </a:cxn>
+                  <a:cxn ang="0">
+                    <a:pos x="T8" y="T9"/>
+                  </a:cxn>
+                </a:cxnLst>
+                <a:rect l="0" t="0" r="r" b="b"/>
+                <a:pathLst>
+                  <a:path w="748" h="1161">
+                    <a:moveTo>
+                      <a:pt x="452" y="0"/>
+                    </a:moveTo>
+                    <a:lnTo>
+                      <a:pt x="748" y="0"/>
+                    </a:lnTo>
+                    <a:lnTo>
+                      <a:pt x="296" y="1161"/>
+                    </a:lnTo>
+                    <a:lnTo>
+                      <a:pt x="0" y="1161"/>
+                    </a:lnTo>
+                    <a:lnTo>
+                      <a:pt x="452" y="0"/>
+                    </a:lnTo>
+                    <a:close/>
+                  </a:path>
+                </a:pathLst>
+              </a:custGeom>
+              <a:ln>
+                <a:headEnd/>
+                <a:tailEnd/>
+              </a:ln>
+            </p:spPr>
+            <p:style>
+              <a:lnRef idx="2">
+                <a:schemeClr val="accent6">
+                  <a:shade val="50000"/>
+                </a:schemeClr>
+              </a:lnRef>
+              <a:fillRef idx="1">
+                <a:schemeClr val="accent6"/>
+              </a:fillRef>
+              <a:effectRef idx="0">
+                <a:schemeClr val="accent6"/>
+              </a:effectRef>
+              <a:fontRef idx="minor">
+                <a:schemeClr val="lt1"/>
+              </a:fontRef>
+            </p:style>
+            <p:txBody>
+              <a:bodyPr/>
+              <a:lstStyle/>
+              <a:p>
+                <a:endParaRPr lang="es-PE"/>
+              </a:p>
+            </p:txBody>
+          </p:sp>
+          <p:sp>
+            <p:nvSpPr>
+              <p:cNvPr id="18" name="Freeform 7">
+                <a:extLst>
+                  <a:ext uri="{FF2B5EF4-FFF2-40B4-BE49-F238E27FC236}">
+                    <a16:creationId xmlns:a16="http://schemas.microsoft.com/office/drawing/2014/main" id="{4CFED28E-43A9-45B8-BAC1-462956DFBD51}"/>
+                  </a:ext>
+                </a:extLst>
+              </p:cNvPr>
+              <p:cNvSpPr>
+                <a:spLocks/>
+              </p:cNvSpPr>
+              <p:nvPr/>
+            </p:nvSpPr>
+            <p:spPr bwMode="auto">
+              <a:xfrm>
+                <a:off x="66" y="0"/>
+                <a:ext cx="34" cy="53"/>
+              </a:xfrm>
+              <a:custGeom>
+                <a:avLst/>
+                <a:gdLst>
+                  <a:gd name="T0" fmla="*/ 453 w 749"/>
+                  <a:gd name="T1" fmla="*/ 0 h 1161"/>
+                  <a:gd name="T2" fmla="*/ 749 w 749"/>
+                  <a:gd name="T3" fmla="*/ 0 h 1161"/>
+                  <a:gd name="T4" fmla="*/ 297 w 749"/>
+                  <a:gd name="T5" fmla="*/ 1161 h 1161"/>
+                  <a:gd name="T6" fmla="*/ 0 w 749"/>
+                  <a:gd name="T7" fmla="*/ 1161 h 1161"/>
+                  <a:gd name="T8" fmla="*/ 453 w 749"/>
+                  <a:gd name="T9" fmla="*/ 0 h 1161"/>
+                </a:gdLst>
+                <a:ahLst/>
+                <a:cxnLst>
+                  <a:cxn ang="0">
+                    <a:pos x="T0" y="T1"/>
+                  </a:cxn>
+                  <a:cxn ang="0">
+                    <a:pos x="T2" y="T3"/>
+                  </a:cxn>
+                  <a:cxn ang="0">
+                    <a:pos x="T4" y="T5"/>
+                  </a:cxn>
+                  <a:cxn ang="0">
+                    <a:pos x="T6" y="T7"/>
+                  </a:cxn>
+                  <a:cxn ang="0">
+                    <a:pos x="T8" y="T9"/>
+                  </a:cxn>
+                </a:cxnLst>
+                <a:rect l="0" t="0" r="r" b="b"/>
+                <a:pathLst>
+                  <a:path w="749" h="1161">
+                    <a:moveTo>
+                      <a:pt x="453" y="0"/>
+                    </a:moveTo>
+                    <a:lnTo>
+                      <a:pt x="749" y="0"/>
+                    </a:lnTo>
+                    <a:lnTo>
+                      <a:pt x="297" y="1161"/>
+                    </a:lnTo>
+                    <a:lnTo>
+                      <a:pt x="0" y="1161"/>
+                    </a:lnTo>
+                    <a:lnTo>
+                      <a:pt x="453" y="0"/>
+                    </a:lnTo>
+                    <a:close/>
+                  </a:path>
+                </a:pathLst>
+              </a:custGeom>
+              <a:ln>
+                <a:headEnd/>
+                <a:tailEnd/>
+              </a:ln>
+            </p:spPr>
+            <p:style>
+              <a:lnRef idx="2">
+                <a:schemeClr val="accent6">
+                  <a:shade val="50000"/>
+                </a:schemeClr>
+              </a:lnRef>
+              <a:fillRef idx="1">
+                <a:schemeClr val="accent6"/>
+              </a:fillRef>
+              <a:effectRef idx="0">
+                <a:schemeClr val="accent6"/>
+              </a:effectRef>
+              <a:fontRef idx="minor">
+                <a:schemeClr val="lt1"/>
+              </a:fontRef>
+            </p:style>
+            <p:txBody>
+              <a:bodyPr/>
+              <a:lstStyle/>
+              <a:p>
+                <a:endParaRPr lang="es-PE"/>
+              </a:p>
+            </p:txBody>
+          </p:sp>
+          <p:sp>
+            <p:nvSpPr>
+              <p:cNvPr id="19" name="Freeform 8">
+                <a:extLst>
+                  <a:ext uri="{FF2B5EF4-FFF2-40B4-BE49-F238E27FC236}">
+                    <a16:creationId xmlns:a16="http://schemas.microsoft.com/office/drawing/2014/main" id="{32EDEE51-D66B-4564-ACBA-B3371EFE67E8}"/>
+                  </a:ext>
+                </a:extLst>
+              </p:cNvPr>
+              <p:cNvSpPr>
+                <a:spLocks/>
+              </p:cNvSpPr>
+              <p:nvPr/>
+            </p:nvSpPr>
+            <p:spPr bwMode="auto">
+              <a:xfrm>
+                <a:off x="93" y="0"/>
+                <a:ext cx="34" cy="53"/>
+              </a:xfrm>
+              <a:custGeom>
+                <a:avLst/>
+                <a:gdLst>
+                  <a:gd name="T0" fmla="*/ 453 w 749"/>
+                  <a:gd name="T1" fmla="*/ 0 h 1161"/>
+                  <a:gd name="T2" fmla="*/ 749 w 749"/>
+                  <a:gd name="T3" fmla="*/ 0 h 1161"/>
+                  <a:gd name="T4" fmla="*/ 297 w 749"/>
+                  <a:gd name="T5" fmla="*/ 1161 h 1161"/>
+                  <a:gd name="T6" fmla="*/ 0 w 749"/>
+                  <a:gd name="T7" fmla="*/ 1161 h 1161"/>
+                  <a:gd name="T8" fmla="*/ 453 w 749"/>
+                  <a:gd name="T9" fmla="*/ 0 h 1161"/>
+                </a:gdLst>
+                <a:ahLst/>
+                <a:cxnLst>
+                  <a:cxn ang="0">
+                    <a:pos x="T0" y="T1"/>
+                  </a:cxn>
+                  <a:cxn ang="0">
+                    <a:pos x="T2" y="T3"/>
+                  </a:cxn>
+                  <a:cxn ang="0">
+                    <a:pos x="T4" y="T5"/>
+                  </a:cxn>
+                  <a:cxn ang="0">
+                    <a:pos x="T6" y="T7"/>
+                  </a:cxn>
+                  <a:cxn ang="0">
+                    <a:pos x="T8" y="T9"/>
+                  </a:cxn>
+                </a:cxnLst>
+                <a:rect l="0" t="0" r="r" b="b"/>
+                <a:pathLst>
+                  <a:path w="749" h="1161">
+                    <a:moveTo>
+                      <a:pt x="453" y="0"/>
+                    </a:moveTo>
+                    <a:lnTo>
+                      <a:pt x="749" y="0"/>
+                    </a:lnTo>
+                    <a:lnTo>
+                      <a:pt x="297" y="1161"/>
+                    </a:lnTo>
+                    <a:lnTo>
+                      <a:pt x="0" y="1161"/>
+                    </a:lnTo>
+                    <a:lnTo>
+                      <a:pt x="453" y="0"/>
+                    </a:lnTo>
+                    <a:close/>
+                  </a:path>
+                </a:pathLst>
+              </a:custGeom>
+              <a:ln>
+                <a:headEnd/>
+                <a:tailEnd/>
+              </a:ln>
+            </p:spPr>
+            <p:style>
+              <a:lnRef idx="2">
+                <a:schemeClr val="accent6">
+                  <a:shade val="50000"/>
+                </a:schemeClr>
+              </a:lnRef>
+              <a:fillRef idx="1">
+                <a:schemeClr val="accent6"/>
+              </a:fillRef>
+              <a:effectRef idx="0">
+                <a:schemeClr val="accent6"/>
+              </a:effectRef>
+              <a:fontRef idx="minor">
+                <a:schemeClr val="lt1"/>
+              </a:fontRef>
+            </p:style>
+            <p:txBody>
+              <a:bodyPr/>
+              <a:lstStyle/>
+              <a:p>
+                <a:endParaRPr lang="es-PE"/>
+              </a:p>
+            </p:txBody>
+          </p:sp>
+          <p:sp>
+            <p:nvSpPr>
+              <p:cNvPr id="20" name="Freeform 9">
+                <a:extLst>
+                  <a:ext uri="{FF2B5EF4-FFF2-40B4-BE49-F238E27FC236}">
+                    <a16:creationId xmlns:a16="http://schemas.microsoft.com/office/drawing/2014/main" id="{BFF101D5-551C-47C5-9E37-9351944CF712}"/>
+                  </a:ext>
+                </a:extLst>
+              </p:cNvPr>
+              <p:cNvSpPr>
+                <a:spLocks/>
+              </p:cNvSpPr>
+              <p:nvPr/>
+            </p:nvSpPr>
+            <p:spPr bwMode="auto">
+              <a:xfrm>
+                <a:off x="120" y="0"/>
+                <a:ext cx="34" cy="53"/>
+              </a:xfrm>
+              <a:custGeom>
+                <a:avLst/>
+                <a:gdLst>
+                  <a:gd name="T0" fmla="*/ 452 w 748"/>
+                  <a:gd name="T1" fmla="*/ 0 h 1161"/>
+                  <a:gd name="T2" fmla="*/ 748 w 748"/>
+                  <a:gd name="T3" fmla="*/ 0 h 1161"/>
+                  <a:gd name="T4" fmla="*/ 297 w 748"/>
+                  <a:gd name="T5" fmla="*/ 1161 h 1161"/>
+                  <a:gd name="T6" fmla="*/ 0 w 748"/>
+                  <a:gd name="T7" fmla="*/ 1161 h 1161"/>
+                  <a:gd name="T8" fmla="*/ 452 w 748"/>
+                  <a:gd name="T9" fmla="*/ 0 h 1161"/>
+                </a:gdLst>
+                <a:ahLst/>
+                <a:cxnLst>
+                  <a:cxn ang="0">
+                    <a:pos x="T0" y="T1"/>
+                  </a:cxn>
+                  <a:cxn ang="0">
+                    <a:pos x="T2" y="T3"/>
+                  </a:cxn>
+                  <a:cxn ang="0">
+                    <a:pos x="T4" y="T5"/>
+                  </a:cxn>
+                  <a:cxn ang="0">
+                    <a:pos x="T6" y="T7"/>
+                  </a:cxn>
+                  <a:cxn ang="0">
+                    <a:pos x="T8" y="T9"/>
+                  </a:cxn>
+                </a:cxnLst>
+                <a:rect l="0" t="0" r="r" b="b"/>
+                <a:pathLst>
+                  <a:path w="748" h="1161">
+                    <a:moveTo>
+                      <a:pt x="452" y="0"/>
+                    </a:moveTo>
+                    <a:lnTo>
+                      <a:pt x="748" y="0"/>
+                    </a:lnTo>
+                    <a:lnTo>
+                      <a:pt x="297" y="1161"/>
+                    </a:lnTo>
+                    <a:lnTo>
+                      <a:pt x="0" y="1161"/>
+                    </a:lnTo>
+                    <a:lnTo>
+                      <a:pt x="452" y="0"/>
+                    </a:lnTo>
+                    <a:close/>
+                  </a:path>
+                </a:pathLst>
+              </a:custGeom>
+              <a:ln>
+                <a:headEnd/>
+                <a:tailEnd/>
+              </a:ln>
+            </p:spPr>
+            <p:style>
+              <a:lnRef idx="2">
+                <a:schemeClr val="accent6">
+                  <a:shade val="50000"/>
+                </a:schemeClr>
+              </a:lnRef>
+              <a:fillRef idx="1">
+                <a:schemeClr val="accent6"/>
+              </a:fillRef>
+              <a:effectRef idx="0">
+                <a:schemeClr val="accent6"/>
+              </a:effectRef>
+              <a:fontRef idx="minor">
+                <a:schemeClr val="lt1"/>
+              </a:fontRef>
+            </p:style>
+            <p:txBody>
+              <a:bodyPr/>
+              <a:lstStyle/>
+              <a:p>
+                <a:endParaRPr lang="es-PE"/>
+              </a:p>
+            </p:txBody>
+          </p:sp>
+        </p:grpSp>
+        <p:pic>
+          <p:nvPicPr>
+            <p:cNvPr id="15" name="Gráfico 14" descr="Serpiente">
+              <a:extLst>
+                <a:ext uri="{FF2B5EF4-FFF2-40B4-BE49-F238E27FC236}">
+                  <a16:creationId xmlns:a16="http://schemas.microsoft.com/office/drawing/2014/main" id="{0F481CE1-26DE-4347-B98C-A93427872C02}"/>
+                </a:ext>
+              </a:extLst>
+            </p:cNvPr>
+            <p:cNvPicPr>
+              <a:picLocks noChangeAspect="1"/>
+            </p:cNvPicPr>
+            <p:nvPr/>
+          </p:nvPicPr>
+          <p:blipFill>
+            <a:blip r:embed="rId2">
+              <a:extLst>
+                <a:ext uri="{96DAC541-7B7A-43D3-8B79-37D633B846F1}">
+                  <asvg:svgBlip xmlns:asvg="http://schemas.microsoft.com/office/drawing/2016/SVG/main" r:embed="rId3"/>
+                </a:ext>
+              </a:extLst>
+            </a:blip>
+            <a:stretch>
+              <a:fillRect/>
+            </a:stretch>
+          </p:blipFill>
+          <p:spPr>
+            <a:xfrm rot="17878565" flipV="1">
+              <a:off x="1681236" y="253465"/>
+              <a:ext cx="669574" cy="669574"/>
+            </a:xfrm>
+            <a:prstGeom prst="rect">
+              <a:avLst/>
+            </a:prstGeom>
+          </p:spPr>
+        </p:pic>
+      </p:grpSp>
+      <p:sp>
+        <p:nvSpPr>
+          <p:cNvPr id="23" name="CuadroTexto 22">
+            <a:extLst>
+              <a:ext uri="{FF2B5EF4-FFF2-40B4-BE49-F238E27FC236}">
+                <a16:creationId xmlns:a16="http://schemas.microsoft.com/office/drawing/2014/main" id="{758310EE-8FBF-4E7F-A961-85FB3837D3F9}"/>
+              </a:ext>
+            </a:extLst>
+          </p:cNvPr>
+          <p:cNvSpPr txBox="1"/>
+          <p:nvPr/>
+        </p:nvSpPr>
+        <p:spPr>
+          <a:xfrm>
+            <a:off x="1721075" y="6309550"/>
+            <a:ext cx="8749849" cy="276999"/>
+          </a:xfrm>
+          <a:prstGeom prst="rect">
+            <a:avLst/>
+          </a:prstGeom>
+          <a:noFill/>
+        </p:spPr>
+        <p:txBody>
+          <a:bodyPr wrap="square" rtlCol="0">
+            <a:spAutoFit/>
+          </a:bodyPr>
+          <a:lstStyle/>
+          <a:p>
+            <a:pPr algn="ctr"/>
+            <a:r>
+              <a:rPr lang="es-PE" sz="1200" b="1" dirty="0">
+                <a:solidFill>
+                  <a:schemeClr val="accent6">
+                    <a:lumMod val="60000"/>
+                    <a:lumOff val="40000"/>
+                  </a:schemeClr>
+                </a:solidFill>
+              </a:rPr>
+              <a:t>https://github.com/MayumyCH/dsfem_datachallenge_monthly/blob/main/the_minion_game/the_minion_game.ipynb</a:t>
+            </a:r>
+          </a:p>
+        </p:txBody>
+      </p:sp>
+      <p:pic>
+        <p:nvPicPr>
+          <p:cNvPr id="21" name="Imagen 20">
+            <a:extLst>
+              <a:ext uri="{FF2B5EF4-FFF2-40B4-BE49-F238E27FC236}">
+                <a16:creationId xmlns:a16="http://schemas.microsoft.com/office/drawing/2014/main" id="{F15C9689-FF98-4B98-84EE-FA2745A4E0E3}"/>
+              </a:ext>
+            </a:extLst>
+          </p:cNvPr>
+          <p:cNvPicPr>
+            <a:picLocks noChangeAspect="1"/>
+          </p:cNvPicPr>
+          <p:nvPr/>
+        </p:nvPicPr>
+        <p:blipFill>
+          <a:blip r:embed="rId4"/>
+          <a:stretch>
+            <a:fillRect/>
+          </a:stretch>
+        </p:blipFill>
+        <p:spPr>
+          <a:xfrm>
+            <a:off x="10672628" y="-15934"/>
+            <a:ext cx="1262173" cy="1262173"/>
+          </a:xfrm>
+          <a:prstGeom prst="rect">
+            <a:avLst/>
+          </a:prstGeom>
+          <a:ln>
+            <a:noFill/>
+          </a:ln>
+          <a:effectLst>
+            <a:outerShdw blurRad="292100" dist="139700" dir="2700000" algn="tl" rotWithShape="0">
+              <a:srgbClr val="333333">
+                <a:alpha val="65000"/>
+              </a:srgbClr>
+            </a:outerShdw>
+          </a:effectLst>
+        </p:spPr>
+      </p:pic>
+      <p:sp>
+        <p:nvSpPr>
+          <p:cNvPr id="24" name="Título 1">
+            <a:extLst>
+              <a:ext uri="{FF2B5EF4-FFF2-40B4-BE49-F238E27FC236}">
+                <a16:creationId xmlns:a16="http://schemas.microsoft.com/office/drawing/2014/main" id="{3C50EA28-9EF4-44B9-9A38-582802914981}"/>
+              </a:ext>
+            </a:extLst>
+          </p:cNvPr>
+          <p:cNvSpPr txBox="1">
+            <a:spLocks/>
+          </p:cNvSpPr>
+          <p:nvPr/>
+        </p:nvSpPr>
+        <p:spPr>
+          <a:xfrm>
+            <a:off x="2813038" y="462256"/>
+            <a:ext cx="7958331" cy="523820"/>
+          </a:xfrm>
+          <a:prstGeom prst="rect">
+            <a:avLst/>
+          </a:prstGeom>
+        </p:spPr>
+        <p:txBody>
+          <a:bodyPr vert="horz" lIns="91440" tIns="45720" rIns="91440" bIns="45720" rtlCol="0" anchor="t">
+            <a:normAutofit lnSpcReduction="10000"/>
+          </a:bodyPr>
+          <a:lstStyle>
+            <a:lvl1pPr algn="r" defTabSz="914400" rtl="0" eaLnBrk="1" latinLnBrk="0" hangingPunct="1">
+              <a:lnSpc>
+                <a:spcPct val="90000"/>
+              </a:lnSpc>
+              <a:spcBef>
+                <a:spcPct val="0"/>
+              </a:spcBef>
+              <a:buNone/>
+              <a:defRPr sz="3400" b="0" i="0" kern="1200" cap="none">
+                <a:solidFill>
+                  <a:schemeClr val="tx1"/>
+                </a:solidFill>
+                <a:effectLst/>
+                <a:latin typeface="+mj-lt"/>
+                <a:ea typeface="+mj-ea"/>
+                <a:cs typeface="+mj-cs"/>
+              </a:defRPr>
+            </a:lvl1pPr>
+          </a:lstStyle>
+          <a:p>
+            <a:pPr algn="ctr"/>
+            <a:r>
+              <a:rPr lang="es-ES" b="1" dirty="0"/>
+              <a:t>Solución - Código</a:t>
+            </a:r>
+            <a:endParaRPr lang="es-PE" b="1" dirty="0"/>
+          </a:p>
+        </p:txBody>
+      </p:sp>
+      <p:pic>
+        <p:nvPicPr>
+          <p:cNvPr id="3" name="Imagen 2">
+            <a:extLst>
+              <a:ext uri="{FF2B5EF4-FFF2-40B4-BE49-F238E27FC236}">
+                <a16:creationId xmlns:a16="http://schemas.microsoft.com/office/drawing/2014/main" id="{2151B364-FCA4-4A56-B2B5-BD34DB0691CA}"/>
+              </a:ext>
+            </a:extLst>
+          </p:cNvPr>
+          <p:cNvPicPr>
+            <a:picLocks noChangeAspect="1"/>
+          </p:cNvPicPr>
+          <p:nvPr/>
+        </p:nvPicPr>
+        <p:blipFill>
+          <a:blip r:embed="rId5"/>
+          <a:stretch>
+            <a:fillRect/>
+          </a:stretch>
+        </p:blipFill>
+        <p:spPr>
+          <a:xfrm>
+            <a:off x="3941530" y="2310844"/>
+            <a:ext cx="4719132" cy="3351907"/>
+          </a:xfrm>
+          <a:prstGeom prst="rect">
+            <a:avLst/>
+          </a:prstGeom>
+        </p:spPr>
+      </p:pic>
+      <p:sp>
+        <p:nvSpPr>
+          <p:cNvPr id="25" name="CuadroTexto 24">
+            <a:extLst>
+              <a:ext uri="{FF2B5EF4-FFF2-40B4-BE49-F238E27FC236}">
+                <a16:creationId xmlns:a16="http://schemas.microsoft.com/office/drawing/2014/main" id="{36952D5A-09BF-424F-879F-0133A13A95A1}"/>
+              </a:ext>
+            </a:extLst>
+          </p:cNvPr>
+          <p:cNvSpPr txBox="1"/>
+          <p:nvPr/>
+        </p:nvSpPr>
+        <p:spPr>
+          <a:xfrm>
+            <a:off x="1220202" y="1689572"/>
+            <a:ext cx="3012644" cy="338554"/>
+          </a:xfrm>
+          <a:prstGeom prst="rect">
+            <a:avLst/>
+          </a:prstGeom>
+          <a:noFill/>
+        </p:spPr>
+        <p:txBody>
+          <a:bodyPr wrap="square">
+            <a:spAutoFit/>
+          </a:bodyPr>
+          <a:lstStyle/>
+          <a:p>
+            <a:r>
+              <a:rPr lang="es-PE" sz="1600" b="1" dirty="0">
+                <a:effectLst/>
+                <a:latin typeface="Open Sans" panose="020B0604020202020204" pitchFamily="34" charset="0"/>
+                <a:ea typeface="Open Sans" panose="020B0604020202020204" pitchFamily="34" charset="0"/>
+                <a:cs typeface="Open Sans" panose="020B0604020202020204" pitchFamily="34" charset="0"/>
+              </a:rPr>
+              <a:t>Concepto Previos</a:t>
+            </a:r>
+            <a:endParaRPr lang="es-PE" sz="1600" b="1" dirty="0">
+              <a:latin typeface="Open Sans" panose="020B0604020202020204" pitchFamily="34" charset="0"/>
+              <a:ea typeface="Open Sans" panose="020B0604020202020204" pitchFamily="34" charset="0"/>
+              <a:cs typeface="Open Sans" panose="020B0604020202020204" pitchFamily="34" charset="0"/>
+            </a:endParaRPr>
+          </a:p>
+        </p:txBody>
+      </p:sp>
+    </p:spTree>
+    <p:extLst>
+      <p:ext uri="{BB962C8B-B14F-4D97-AF65-F5344CB8AC3E}">
+        <p14:creationId xmlns:p14="http://schemas.microsoft.com/office/powerpoint/2010/main" val="2296202469"/>
+      </p:ext>
+    </p:extLst>
+  </p:cSld>
+  <p:clrMapOvr>
+    <a:masterClrMapping/>
+  </p:clrMapOvr>
+</p:sld>
+</file>
+
+<file path=ppt/slides/slide9.xml><?xml version="1.0" encoding="utf-8"?>
+<p:sld xmlns:a="http://schemas.openxmlformats.org/drawingml/2006/main" xmlns:r="http://schemas.openxmlformats.org/officeDocument/2006/relationships" xmlns:p="http://schemas.openxmlformats.org/presentationml/2006/main">
+  <p:cSld>
+    <p:spTree>
+      <p:nvGrpSpPr>
+        <p:cNvPr id="1" name=""/>
+        <p:cNvGrpSpPr/>
+        <p:nvPr/>
+      </p:nvGrpSpPr>
+      <p:grpSpPr>
+        <a:xfrm>
+          <a:off x="0" y="0"/>
+          <a:ext cx="0" cy="0"/>
+          <a:chOff x="0" y="0"/>
+          <a:chExt cx="0" cy="0"/>
+        </a:xfrm>
+      </p:grpSpPr>
+      <p:pic>
+        <p:nvPicPr>
+          <p:cNvPr id="4" name="Imagen 3">
+            <a:extLst>
+              <a:ext uri="{FF2B5EF4-FFF2-40B4-BE49-F238E27FC236}">
+                <a16:creationId xmlns:a16="http://schemas.microsoft.com/office/drawing/2014/main" id="{1CDB8CD7-7205-437B-A42F-90E8048CDC3E}"/>
+              </a:ext>
+            </a:extLst>
+          </p:cNvPr>
+          <p:cNvPicPr>
+            <a:picLocks noChangeAspect="1"/>
+          </p:cNvPicPr>
+          <p:nvPr/>
+        </p:nvPicPr>
+        <p:blipFill>
+          <a:blip r:embed="rId2"/>
+          <a:stretch>
+            <a:fillRect/>
+          </a:stretch>
+        </p:blipFill>
+        <p:spPr>
+          <a:xfrm>
+            <a:off x="10971798" y="190230"/>
+            <a:ext cx="1005875" cy="1005875"/>
+          </a:xfrm>
+          <a:prstGeom prst="rect">
+            <a:avLst/>
+          </a:prstGeom>
+          <a:ln>
+            <a:noFill/>
+          </a:ln>
+          <a:effectLst>
+            <a:outerShdw blurRad="292100" dist="139700" dir="2700000" algn="tl" rotWithShape="0">
+              <a:srgbClr val="333333">
+                <a:alpha val="65000"/>
+              </a:srgbClr>
+            </a:outerShdw>
+          </a:effectLst>
+        </p:spPr>
+      </p:pic>
+      <p:grpSp>
+        <p:nvGrpSpPr>
+          <p:cNvPr id="13" name="Grupo 12">
+            <a:extLst>
+              <a:ext uri="{FF2B5EF4-FFF2-40B4-BE49-F238E27FC236}">
+                <a16:creationId xmlns:a16="http://schemas.microsoft.com/office/drawing/2014/main" id="{096A5902-9744-4AC3-9700-70E13FAE4EF8}"/>
+              </a:ext>
+            </a:extLst>
+          </p:cNvPr>
+          <p:cNvGrpSpPr/>
+          <p:nvPr/>
+        </p:nvGrpSpPr>
+        <p:grpSpPr>
+          <a:xfrm>
+            <a:off x="1220202" y="389379"/>
+            <a:ext cx="2229972" cy="669574"/>
+            <a:chOff x="1010052" y="253465"/>
+            <a:chExt cx="2229972" cy="669574"/>
+          </a:xfrm>
+        </p:grpSpPr>
+        <p:grpSp>
+          <p:nvGrpSpPr>
+            <p:cNvPr id="14" name="Header Artwork" descr="&quot;&quot;" title="Gráfico del título">
+              <a:extLst>
+                <a:ext uri="{FF2B5EF4-FFF2-40B4-BE49-F238E27FC236}">
+                  <a16:creationId xmlns:a16="http://schemas.microsoft.com/office/drawing/2014/main" id="{B1AC7219-10DD-414B-B171-7DB4620CCDC9}"/>
+                </a:ext>
+              </a:extLst>
+            </p:cNvPr>
+            <p:cNvGrpSpPr/>
+            <p:nvPr/>
+          </p:nvGrpSpPr>
+          <p:grpSpPr bwMode="auto">
+            <a:xfrm>
+              <a:off x="1010052" y="298492"/>
+              <a:ext cx="2229972" cy="517525"/>
+              <a:chOff x="0" y="0"/>
+              <a:chExt cx="154" cy="53"/>
+            </a:xfrm>
+            <a:solidFill>
+              <a:schemeClr val="accent5">
+                <a:lumMod val="40000"/>
+                <a:lumOff val="60000"/>
+              </a:schemeClr>
+            </a:solidFill>
+          </p:grpSpPr>
+          <p:sp>
+            <p:nvSpPr>
+              <p:cNvPr id="16" name="Freeform 5">
+                <a:extLst>
+                  <a:ext uri="{FF2B5EF4-FFF2-40B4-BE49-F238E27FC236}">
+                    <a16:creationId xmlns:a16="http://schemas.microsoft.com/office/drawing/2014/main" id="{5484981B-7E4B-4867-964E-6C6285DFF840}"/>
+                  </a:ext>
+                </a:extLst>
+              </p:cNvPr>
+              <p:cNvSpPr>
+                <a:spLocks/>
+              </p:cNvSpPr>
+              <p:nvPr/>
+            </p:nvSpPr>
+            <p:spPr bwMode="auto">
+              <a:xfrm>
+                <a:off x="0" y="0"/>
+                <a:ext cx="46" cy="53"/>
+              </a:xfrm>
+              <a:custGeom>
+                <a:avLst/>
+                <a:gdLst>
+                  <a:gd name="T0" fmla="*/ 0 w 1022"/>
+                  <a:gd name="T1" fmla="*/ 0 h 1161"/>
+                  <a:gd name="T2" fmla="*/ 1022 w 1022"/>
+                  <a:gd name="T3" fmla="*/ 0 h 1161"/>
+                  <a:gd name="T4" fmla="*/ 570 w 1022"/>
+                  <a:gd name="T5" fmla="*/ 1161 h 1161"/>
+                  <a:gd name="T6" fmla="*/ 0 w 1022"/>
+                  <a:gd name="T7" fmla="*/ 1161 h 1161"/>
+                  <a:gd name="T8" fmla="*/ 0 w 1022"/>
+                  <a:gd name="T9" fmla="*/ 0 h 1161"/>
+                </a:gdLst>
+                <a:ahLst/>
+                <a:cxnLst>
+                  <a:cxn ang="0">
+                    <a:pos x="T0" y="T1"/>
+                  </a:cxn>
+                  <a:cxn ang="0">
+                    <a:pos x="T2" y="T3"/>
+                  </a:cxn>
+                  <a:cxn ang="0">
+                    <a:pos x="T4" y="T5"/>
+                  </a:cxn>
+                  <a:cxn ang="0">
+                    <a:pos x="T6" y="T7"/>
+                  </a:cxn>
+                  <a:cxn ang="0">
+                    <a:pos x="T8" y="T9"/>
+                  </a:cxn>
+                </a:cxnLst>
+                <a:rect l="0" t="0" r="r" b="b"/>
+                <a:pathLst>
+                  <a:path w="1022" h="1161">
+                    <a:moveTo>
+                      <a:pt x="0" y="0"/>
+                    </a:moveTo>
+                    <a:lnTo>
+                      <a:pt x="1022" y="0"/>
+                    </a:lnTo>
+                    <a:lnTo>
+                      <a:pt x="570" y="1161"/>
+                    </a:lnTo>
+                    <a:lnTo>
+                      <a:pt x="0" y="1161"/>
+                    </a:lnTo>
+                    <a:lnTo>
+                      <a:pt x="0" y="0"/>
+                    </a:lnTo>
+                    <a:close/>
+                  </a:path>
+                </a:pathLst>
+              </a:custGeom>
+              <a:ln>
+                <a:headEnd/>
+                <a:tailEnd/>
+              </a:ln>
+            </p:spPr>
+            <p:style>
+              <a:lnRef idx="2">
+                <a:schemeClr val="accent6">
+                  <a:shade val="50000"/>
+                </a:schemeClr>
+              </a:lnRef>
+              <a:fillRef idx="1">
+                <a:schemeClr val="accent6"/>
+              </a:fillRef>
+              <a:effectRef idx="0">
+                <a:schemeClr val="accent6"/>
+              </a:effectRef>
+              <a:fontRef idx="minor">
+                <a:schemeClr val="lt1"/>
+              </a:fontRef>
+            </p:style>
+            <p:txBody>
+              <a:bodyPr/>
+              <a:lstStyle/>
+              <a:p>
+                <a:endParaRPr lang="es-PE"/>
+              </a:p>
+            </p:txBody>
+          </p:sp>
+          <p:sp>
+            <p:nvSpPr>
+              <p:cNvPr id="17" name="Freeform 6">
+                <a:extLst>
+                  <a:ext uri="{FF2B5EF4-FFF2-40B4-BE49-F238E27FC236}">
+                    <a16:creationId xmlns:a16="http://schemas.microsoft.com/office/drawing/2014/main" id="{DC6D10AF-9C43-4D48-8E39-9559EF9A3C67}"/>
+                  </a:ext>
+                </a:extLst>
+              </p:cNvPr>
+              <p:cNvSpPr>
+                <a:spLocks/>
+              </p:cNvSpPr>
+              <p:nvPr/>
+            </p:nvSpPr>
+            <p:spPr bwMode="auto">
+              <a:xfrm>
+                <a:off x="39" y="0"/>
+                <a:ext cx="34" cy="53"/>
+              </a:xfrm>
+              <a:custGeom>
+                <a:avLst/>
+                <a:gdLst>
+                  <a:gd name="T0" fmla="*/ 452 w 748"/>
+                  <a:gd name="T1" fmla="*/ 0 h 1161"/>
+                  <a:gd name="T2" fmla="*/ 748 w 748"/>
+                  <a:gd name="T3" fmla="*/ 0 h 1161"/>
+                  <a:gd name="T4" fmla="*/ 296 w 748"/>
+                  <a:gd name="T5" fmla="*/ 1161 h 1161"/>
+                  <a:gd name="T6" fmla="*/ 0 w 748"/>
+                  <a:gd name="T7" fmla="*/ 1161 h 1161"/>
+                  <a:gd name="T8" fmla="*/ 452 w 748"/>
+                  <a:gd name="T9" fmla="*/ 0 h 1161"/>
+                </a:gdLst>
+                <a:ahLst/>
+                <a:cxnLst>
+                  <a:cxn ang="0">
+                    <a:pos x="T0" y="T1"/>
+                  </a:cxn>
+                  <a:cxn ang="0">
+                    <a:pos x="T2" y="T3"/>
+                  </a:cxn>
+                  <a:cxn ang="0">
+                    <a:pos x="T4" y="T5"/>
+                  </a:cxn>
+                  <a:cxn ang="0">
+                    <a:pos x="T6" y="T7"/>
+                  </a:cxn>
+                  <a:cxn ang="0">
+                    <a:pos x="T8" y="T9"/>
+                  </a:cxn>
+                </a:cxnLst>
+                <a:rect l="0" t="0" r="r" b="b"/>
+                <a:pathLst>
+                  <a:path w="748" h="1161">
+                    <a:moveTo>
+                      <a:pt x="452" y="0"/>
+                    </a:moveTo>
+                    <a:lnTo>
+                      <a:pt x="748" y="0"/>
+                    </a:lnTo>
+                    <a:lnTo>
+                      <a:pt x="296" y="1161"/>
+                    </a:lnTo>
+                    <a:lnTo>
+                      <a:pt x="0" y="1161"/>
+                    </a:lnTo>
+                    <a:lnTo>
+                      <a:pt x="452" y="0"/>
+                    </a:lnTo>
+                    <a:close/>
+                  </a:path>
+                </a:pathLst>
+              </a:custGeom>
+              <a:ln>
+                <a:headEnd/>
+                <a:tailEnd/>
+              </a:ln>
+            </p:spPr>
+            <p:style>
+              <a:lnRef idx="2">
+                <a:schemeClr val="accent6">
+                  <a:shade val="50000"/>
+                </a:schemeClr>
+              </a:lnRef>
+              <a:fillRef idx="1">
+                <a:schemeClr val="accent6"/>
+              </a:fillRef>
+              <a:effectRef idx="0">
+                <a:schemeClr val="accent6"/>
+              </a:effectRef>
+              <a:fontRef idx="minor">
+                <a:schemeClr val="lt1"/>
+              </a:fontRef>
+            </p:style>
+            <p:txBody>
+              <a:bodyPr/>
+              <a:lstStyle/>
+              <a:p>
+                <a:endParaRPr lang="es-PE"/>
+              </a:p>
+            </p:txBody>
+          </p:sp>
+          <p:sp>
+            <p:nvSpPr>
+              <p:cNvPr id="18" name="Freeform 7">
+                <a:extLst>
+                  <a:ext uri="{FF2B5EF4-FFF2-40B4-BE49-F238E27FC236}">
+                    <a16:creationId xmlns:a16="http://schemas.microsoft.com/office/drawing/2014/main" id="{4CFED28E-43A9-45B8-BAC1-462956DFBD51}"/>
+                  </a:ext>
+                </a:extLst>
+              </p:cNvPr>
+              <p:cNvSpPr>
+                <a:spLocks/>
+              </p:cNvSpPr>
+              <p:nvPr/>
+            </p:nvSpPr>
+            <p:spPr bwMode="auto">
+              <a:xfrm>
+                <a:off x="66" y="0"/>
+                <a:ext cx="34" cy="53"/>
+              </a:xfrm>
+              <a:custGeom>
+                <a:avLst/>
+                <a:gdLst>
+                  <a:gd name="T0" fmla="*/ 453 w 749"/>
+                  <a:gd name="T1" fmla="*/ 0 h 1161"/>
+                  <a:gd name="T2" fmla="*/ 749 w 749"/>
+                  <a:gd name="T3" fmla="*/ 0 h 1161"/>
+                  <a:gd name="T4" fmla="*/ 297 w 749"/>
+                  <a:gd name="T5" fmla="*/ 1161 h 1161"/>
+                  <a:gd name="T6" fmla="*/ 0 w 749"/>
+                  <a:gd name="T7" fmla="*/ 1161 h 1161"/>
+                  <a:gd name="T8" fmla="*/ 453 w 749"/>
+                  <a:gd name="T9" fmla="*/ 0 h 1161"/>
+                </a:gdLst>
+                <a:ahLst/>
+                <a:cxnLst>
+                  <a:cxn ang="0">
+                    <a:pos x="T0" y="T1"/>
+                  </a:cxn>
+                  <a:cxn ang="0">
+                    <a:pos x="T2" y="T3"/>
+                  </a:cxn>
+                  <a:cxn ang="0">
+                    <a:pos x="T4" y="T5"/>
+                  </a:cxn>
+                  <a:cxn ang="0">
+                    <a:pos x="T6" y="T7"/>
+                  </a:cxn>
+                  <a:cxn ang="0">
+                    <a:pos x="T8" y="T9"/>
+                  </a:cxn>
+                </a:cxnLst>
+                <a:rect l="0" t="0" r="r" b="b"/>
+                <a:pathLst>
+                  <a:path w="749" h="1161">
+                    <a:moveTo>
+                      <a:pt x="453" y="0"/>
+                    </a:moveTo>
+                    <a:lnTo>
+                      <a:pt x="749" y="0"/>
+                    </a:lnTo>
+                    <a:lnTo>
+                      <a:pt x="297" y="1161"/>
+                    </a:lnTo>
+                    <a:lnTo>
+                      <a:pt x="0" y="1161"/>
+                    </a:lnTo>
+                    <a:lnTo>
+                      <a:pt x="453" y="0"/>
+                    </a:lnTo>
+                    <a:close/>
+                  </a:path>
+                </a:pathLst>
+              </a:custGeom>
+              <a:ln>
+                <a:headEnd/>
+                <a:tailEnd/>
+              </a:ln>
+            </p:spPr>
+            <p:style>
+              <a:lnRef idx="2">
+                <a:schemeClr val="accent6">
+                  <a:shade val="50000"/>
+                </a:schemeClr>
+              </a:lnRef>
+              <a:fillRef idx="1">
+                <a:schemeClr val="accent6"/>
+              </a:fillRef>
+              <a:effectRef idx="0">
+                <a:schemeClr val="accent6"/>
+              </a:effectRef>
+              <a:fontRef idx="minor">
+                <a:schemeClr val="lt1"/>
+              </a:fontRef>
+            </p:style>
+            <p:txBody>
+              <a:bodyPr/>
+              <a:lstStyle/>
+              <a:p>
+                <a:endParaRPr lang="es-PE"/>
+              </a:p>
+            </p:txBody>
+          </p:sp>
+          <p:sp>
+            <p:nvSpPr>
+              <p:cNvPr id="19" name="Freeform 8">
+                <a:extLst>
+                  <a:ext uri="{FF2B5EF4-FFF2-40B4-BE49-F238E27FC236}">
+                    <a16:creationId xmlns:a16="http://schemas.microsoft.com/office/drawing/2014/main" id="{32EDEE51-D66B-4564-ACBA-B3371EFE67E8}"/>
+                  </a:ext>
+                </a:extLst>
+              </p:cNvPr>
+              <p:cNvSpPr>
+                <a:spLocks/>
+              </p:cNvSpPr>
+              <p:nvPr/>
+            </p:nvSpPr>
+            <p:spPr bwMode="auto">
+              <a:xfrm>
+                <a:off x="93" y="0"/>
+                <a:ext cx="34" cy="53"/>
+              </a:xfrm>
+              <a:custGeom>
+                <a:avLst/>
+                <a:gdLst>
+                  <a:gd name="T0" fmla="*/ 453 w 749"/>
+                  <a:gd name="T1" fmla="*/ 0 h 1161"/>
+                  <a:gd name="T2" fmla="*/ 749 w 749"/>
+                  <a:gd name="T3" fmla="*/ 0 h 1161"/>
+                  <a:gd name="T4" fmla="*/ 297 w 749"/>
+                  <a:gd name="T5" fmla="*/ 1161 h 1161"/>
+                  <a:gd name="T6" fmla="*/ 0 w 749"/>
+                  <a:gd name="T7" fmla="*/ 1161 h 1161"/>
+                  <a:gd name="T8" fmla="*/ 453 w 749"/>
+                  <a:gd name="T9" fmla="*/ 0 h 1161"/>
+                </a:gdLst>
+                <a:ahLst/>
+                <a:cxnLst>
+                  <a:cxn ang="0">
+                    <a:pos x="T0" y="T1"/>
+                  </a:cxn>
+                  <a:cxn ang="0">
+                    <a:pos x="T2" y="T3"/>
+                  </a:cxn>
+                  <a:cxn ang="0">
+                    <a:pos x="T4" y="T5"/>
+                  </a:cxn>
+                  <a:cxn ang="0">
+                    <a:pos x="T6" y="T7"/>
+                  </a:cxn>
+                  <a:cxn ang="0">
+                    <a:pos x="T8" y="T9"/>
+                  </a:cxn>
+                </a:cxnLst>
+                <a:rect l="0" t="0" r="r" b="b"/>
+                <a:pathLst>
+                  <a:path w="749" h="1161">
+                    <a:moveTo>
+                      <a:pt x="453" y="0"/>
+                    </a:moveTo>
+                    <a:lnTo>
+                      <a:pt x="749" y="0"/>
+                    </a:lnTo>
+                    <a:lnTo>
+                      <a:pt x="297" y="1161"/>
+                    </a:lnTo>
+                    <a:lnTo>
+                      <a:pt x="0" y="1161"/>
+                    </a:lnTo>
+                    <a:lnTo>
+                      <a:pt x="453" y="0"/>
+                    </a:lnTo>
+                    <a:close/>
+                  </a:path>
+                </a:pathLst>
+              </a:custGeom>
+              <a:ln>
+                <a:headEnd/>
+                <a:tailEnd/>
+              </a:ln>
+            </p:spPr>
+            <p:style>
+              <a:lnRef idx="2">
+                <a:schemeClr val="accent6">
+                  <a:shade val="50000"/>
+                </a:schemeClr>
+              </a:lnRef>
+              <a:fillRef idx="1">
+                <a:schemeClr val="accent6"/>
+              </a:fillRef>
+              <a:effectRef idx="0">
+                <a:schemeClr val="accent6"/>
+              </a:effectRef>
+              <a:fontRef idx="minor">
+                <a:schemeClr val="lt1"/>
+              </a:fontRef>
+            </p:style>
+            <p:txBody>
+              <a:bodyPr/>
+              <a:lstStyle/>
+              <a:p>
+                <a:endParaRPr lang="es-PE"/>
+              </a:p>
+            </p:txBody>
+          </p:sp>
+          <p:sp>
+            <p:nvSpPr>
+              <p:cNvPr id="20" name="Freeform 9">
+                <a:extLst>
+                  <a:ext uri="{FF2B5EF4-FFF2-40B4-BE49-F238E27FC236}">
+                    <a16:creationId xmlns:a16="http://schemas.microsoft.com/office/drawing/2014/main" id="{BFF101D5-551C-47C5-9E37-9351944CF712}"/>
+                  </a:ext>
+                </a:extLst>
+              </p:cNvPr>
+              <p:cNvSpPr>
+                <a:spLocks/>
+              </p:cNvSpPr>
+              <p:nvPr/>
+            </p:nvSpPr>
+            <p:spPr bwMode="auto">
+              <a:xfrm>
+                <a:off x="120" y="0"/>
+                <a:ext cx="34" cy="53"/>
+              </a:xfrm>
+              <a:custGeom>
+                <a:avLst/>
+                <a:gdLst>
+                  <a:gd name="T0" fmla="*/ 452 w 748"/>
+                  <a:gd name="T1" fmla="*/ 0 h 1161"/>
+                  <a:gd name="T2" fmla="*/ 748 w 748"/>
+                  <a:gd name="T3" fmla="*/ 0 h 1161"/>
+                  <a:gd name="T4" fmla="*/ 297 w 748"/>
+                  <a:gd name="T5" fmla="*/ 1161 h 1161"/>
+                  <a:gd name="T6" fmla="*/ 0 w 748"/>
+                  <a:gd name="T7" fmla="*/ 1161 h 1161"/>
+                  <a:gd name="T8" fmla="*/ 452 w 748"/>
+                  <a:gd name="T9" fmla="*/ 0 h 1161"/>
+                </a:gdLst>
+                <a:ahLst/>
+                <a:cxnLst>
+                  <a:cxn ang="0">
+                    <a:pos x="T0" y="T1"/>
+                  </a:cxn>
+                  <a:cxn ang="0">
+                    <a:pos x="T2" y="T3"/>
+                  </a:cxn>
+                  <a:cxn ang="0">
+                    <a:pos x="T4" y="T5"/>
+                  </a:cxn>
+                  <a:cxn ang="0">
+                    <a:pos x="T6" y="T7"/>
+                  </a:cxn>
+                  <a:cxn ang="0">
+                    <a:pos x="T8" y="T9"/>
+                  </a:cxn>
+                </a:cxnLst>
+                <a:rect l="0" t="0" r="r" b="b"/>
+                <a:pathLst>
+                  <a:path w="748" h="1161">
+                    <a:moveTo>
+                      <a:pt x="452" y="0"/>
+                    </a:moveTo>
+                    <a:lnTo>
+                      <a:pt x="748" y="0"/>
+                    </a:lnTo>
+                    <a:lnTo>
+                      <a:pt x="297" y="1161"/>
+                    </a:lnTo>
+                    <a:lnTo>
+                      <a:pt x="0" y="1161"/>
+                    </a:lnTo>
+                    <a:lnTo>
+                      <a:pt x="452" y="0"/>
+                    </a:lnTo>
+                    <a:close/>
+                  </a:path>
+                </a:pathLst>
+              </a:custGeom>
+              <a:ln>
+                <a:headEnd/>
+                <a:tailEnd/>
+              </a:ln>
+            </p:spPr>
+            <p:style>
+              <a:lnRef idx="2">
+                <a:schemeClr val="accent6">
+                  <a:shade val="50000"/>
+                </a:schemeClr>
+              </a:lnRef>
+              <a:fillRef idx="1">
+                <a:schemeClr val="accent6"/>
+              </a:fillRef>
+              <a:effectRef idx="0">
+                <a:schemeClr val="accent6"/>
+              </a:effectRef>
+              <a:fontRef idx="minor">
+                <a:schemeClr val="lt1"/>
+              </a:fontRef>
+            </p:style>
+            <p:txBody>
+              <a:bodyPr/>
+              <a:lstStyle/>
+              <a:p>
+                <a:endParaRPr lang="es-PE"/>
+              </a:p>
+            </p:txBody>
+          </p:sp>
+        </p:grpSp>
+        <p:pic>
+          <p:nvPicPr>
+            <p:cNvPr id="15" name="Gráfico 14" descr="Serpiente">
+              <a:extLst>
+                <a:ext uri="{FF2B5EF4-FFF2-40B4-BE49-F238E27FC236}">
+                  <a16:creationId xmlns:a16="http://schemas.microsoft.com/office/drawing/2014/main" id="{0F481CE1-26DE-4347-B98C-A93427872C02}"/>
+                </a:ext>
+              </a:extLst>
+            </p:cNvPr>
+            <p:cNvPicPr>
+              <a:picLocks noChangeAspect="1"/>
+            </p:cNvPicPr>
+            <p:nvPr/>
+          </p:nvPicPr>
+          <p:blipFill>
+            <a:blip r:embed="rId3">
+              <a:extLst>
+                <a:ext uri="{96DAC541-7B7A-43D3-8B79-37D633B846F1}">
+                  <asvg:svgBlip xmlns:asvg="http://schemas.microsoft.com/office/drawing/2016/SVG/main" r:embed="rId4"/>
+                </a:ext>
+              </a:extLst>
+            </a:blip>
+            <a:stretch>
+              <a:fillRect/>
+            </a:stretch>
+          </p:blipFill>
+          <p:spPr>
+            <a:xfrm rot="17878565" flipV="1">
+              <a:off x="1681236" y="253465"/>
+              <a:ext cx="669574" cy="669574"/>
+            </a:xfrm>
+            <a:prstGeom prst="rect">
+              <a:avLst/>
+            </a:prstGeom>
+          </p:spPr>
+        </p:pic>
+      </p:grpSp>
+      <p:pic>
+        <p:nvPicPr>
+          <p:cNvPr id="3" name="Imagen 2">
+            <a:extLst>
+              <a:ext uri="{FF2B5EF4-FFF2-40B4-BE49-F238E27FC236}">
+                <a16:creationId xmlns:a16="http://schemas.microsoft.com/office/drawing/2014/main" id="{B8865558-BFBD-4B19-AD8F-977CDE4CFB54}"/>
+              </a:ext>
+            </a:extLst>
+          </p:cNvPr>
+          <p:cNvPicPr>
+            <a:picLocks noChangeAspect="1"/>
+          </p:cNvPicPr>
+          <p:nvPr/>
+        </p:nvPicPr>
+        <p:blipFill>
+          <a:blip r:embed="rId5"/>
+          <a:stretch>
+            <a:fillRect/>
+          </a:stretch>
+        </p:blipFill>
+        <p:spPr>
+          <a:xfrm>
+            <a:off x="3881235" y="951931"/>
+            <a:ext cx="7079910" cy="5535930"/>
+          </a:xfrm>
+          <a:prstGeom prst="rect">
+            <a:avLst/>
+          </a:prstGeom>
+        </p:spPr>
+      </p:pic>
+      <p:sp>
+        <p:nvSpPr>
+          <p:cNvPr id="21" name="Título 1">
+            <a:extLst>
+              <a:ext uri="{FF2B5EF4-FFF2-40B4-BE49-F238E27FC236}">
+                <a16:creationId xmlns:a16="http://schemas.microsoft.com/office/drawing/2014/main" id="{859E312F-6587-4C9A-AA63-1BB34C949C34}"/>
+              </a:ext>
+            </a:extLst>
+          </p:cNvPr>
+          <p:cNvSpPr txBox="1">
+            <a:spLocks/>
+          </p:cNvSpPr>
+          <p:nvPr/>
+        </p:nvSpPr>
+        <p:spPr>
+          <a:xfrm>
+            <a:off x="1039031" y="3284165"/>
+            <a:ext cx="2626674" cy="2908810"/>
+          </a:xfrm>
+          <a:prstGeom prst="rect">
+            <a:avLst/>
+          </a:prstGeom>
+        </p:spPr>
+        <p:txBody>
+          <a:bodyPr vert="horz" lIns="91440" tIns="45720" rIns="91440" bIns="45720" rtlCol="0" anchor="t">
+            <a:normAutofit/>
+          </a:bodyPr>
+          <a:lstStyle>
+            <a:lvl1pPr algn="r" defTabSz="914400" rtl="0" eaLnBrk="1" latinLnBrk="0" hangingPunct="1">
+              <a:lnSpc>
+                <a:spcPct val="90000"/>
+              </a:lnSpc>
+              <a:spcBef>
+                <a:spcPct val="0"/>
+              </a:spcBef>
+              <a:buNone/>
+              <a:defRPr sz="3400" b="0" i="0" kern="1200" cap="none">
+                <a:solidFill>
+                  <a:schemeClr val="tx1"/>
+                </a:solidFill>
+                <a:effectLst/>
+                <a:latin typeface="+mj-lt"/>
+                <a:ea typeface="+mj-ea"/>
+                <a:cs typeface="+mj-cs"/>
+              </a:defRPr>
+            </a:lvl1pPr>
+          </a:lstStyle>
+          <a:p>
+            <a:pPr algn="ctr"/>
+            <a:r>
+              <a:rPr lang="es-ES" b="1" dirty="0"/>
+              <a:t>Resolución completa</a:t>
+            </a:r>
+            <a:endParaRPr lang="es-PE" b="1" dirty="0"/>
+          </a:p>
+        </p:txBody>
+      </p:sp>
+    </p:spTree>
+    <p:extLst>
+      <p:ext uri="{BB962C8B-B14F-4D97-AF65-F5344CB8AC3E}">
+        <p14:creationId xmlns:p14="http://schemas.microsoft.com/office/powerpoint/2010/main" val="97831418"/>
       </p:ext>
     </p:extLst>
   </p:cSld>

</xml_diff>